<commit_message>
Updae MDL Tutorial slidedeck
</commit_message>
<xml_diff>
--- a/MDL_Tutorial_2018.pptx
+++ b/MDL_Tutorial_2018.pptx
@@ -22026,13 +22026,8 @@
             <a:pPr lvl="1"/>
             <a:r>
               <a:rPr lang="en-GB" dirty="0" smtClean="0"/>
-              <a:t>Depot compartment definition handles repeated </a:t>
-            </a:r>
-            <a:r>
-              <a:rPr lang="en-GB" smtClean="0"/>
-              <a:t>dosing appropriately.</a:t>
-            </a:r>
-            <a:endParaRPr lang="en-GB" dirty="0" smtClean="0"/>
+              <a:t>Depot compartment definition handles repeated dosing appropriately.</a:t>
+            </a:r>
           </a:p>
         </p:txBody>
       </p:sp>

</xml_diff>

<commit_message>
Minor change to "modular" concept slide
</commit_message>
<xml_diff>
--- a/MDL_Tutorial_2018.pptx
+++ b/MDL_Tutorial_2018.pptx
@@ -5,7 +5,7 @@
     <p:sldMasterId id="2147483655" r:id="rId1"/>
   </p:sldMasterIdLst>
   <p:notesMasterIdLst>
-    <p:notesMasterId r:id="rId78"/>
+    <p:notesMasterId r:id="rId79"/>
   </p:notesMasterIdLst>
   <p:sldIdLst>
     <p:sldId id="344" r:id="rId2"/>
@@ -71,19 +71,20 @@
     <p:sldId id="397" r:id="rId62"/>
     <p:sldId id="398" r:id="rId63"/>
     <p:sldId id="400" r:id="rId64"/>
-    <p:sldId id="395" r:id="rId65"/>
-    <p:sldId id="293" r:id="rId66"/>
-    <p:sldId id="294" r:id="rId67"/>
-    <p:sldId id="295" r:id="rId68"/>
-    <p:sldId id="399" r:id="rId69"/>
-    <p:sldId id="283" r:id="rId70"/>
-    <p:sldId id="284" r:id="rId71"/>
-    <p:sldId id="357" r:id="rId72"/>
-    <p:sldId id="358" r:id="rId73"/>
-    <p:sldId id="359" r:id="rId74"/>
-    <p:sldId id="360" r:id="rId75"/>
-    <p:sldId id="291" r:id="rId76"/>
-    <p:sldId id="292" r:id="rId77"/>
+    <p:sldId id="401" r:id="rId65"/>
+    <p:sldId id="395" r:id="rId66"/>
+    <p:sldId id="293" r:id="rId67"/>
+    <p:sldId id="294" r:id="rId68"/>
+    <p:sldId id="295" r:id="rId69"/>
+    <p:sldId id="399" r:id="rId70"/>
+    <p:sldId id="283" r:id="rId71"/>
+    <p:sldId id="284" r:id="rId72"/>
+    <p:sldId id="357" r:id="rId73"/>
+    <p:sldId id="358" r:id="rId74"/>
+    <p:sldId id="359" r:id="rId75"/>
+    <p:sldId id="360" r:id="rId76"/>
+    <p:sldId id="291" r:id="rId77"/>
+    <p:sldId id="292" r:id="rId78"/>
   </p:sldIdLst>
   <p:sldSz cx="9144000" cy="6858000" type="screen4x3"/>
   <p:notesSz cx="9926638" cy="6858000"/>
@@ -12004,7 +12005,7 @@
               <a:buChar char="▪"/>
             </a:pPr>
             <a:r>
-              <a:rPr lang="en-GB" sz="2400" b="1" i="0" u="none" strike="noStrike" cap="none">
+              <a:rPr lang="en-GB" sz="2400" b="1" i="0" u="none" strike="noStrike" cap="none" dirty="0">
                 <a:solidFill>
                   <a:schemeClr val="dk1"/>
                 </a:solidFill>
@@ -12016,7 +12017,7 @@
               <a:t>Estimation</a:t>
             </a:r>
             <a:r>
-              <a:rPr lang="en-GB" sz="2400" b="0" i="0" u="none" strike="noStrike" cap="none">
+              <a:rPr lang="en-GB" sz="2400" b="0" i="0" u="none" strike="noStrike" cap="none" dirty="0">
                 <a:solidFill>
                   <a:schemeClr val="dk1"/>
                 </a:solidFill>
@@ -12028,7 +12029,7 @@
               <a:t> = </a:t>
             </a:r>
             <a:r>
-              <a:rPr lang="en-GB" sz="2400" b="0" i="0" u="none" strike="noStrike" cap="none">
+              <a:rPr lang="en-GB" sz="2400" b="0" i="0" u="none" strike="noStrike" cap="none" dirty="0">
                 <a:solidFill>
                   <a:srgbClr val="FF66CC"/>
                 </a:solidFill>
@@ -12040,7 +12041,7 @@
               <a:t>Data </a:t>
             </a:r>
             <a:r>
-              <a:rPr lang="en-GB" sz="2400" b="0" i="0" u="none" strike="noStrike" cap="none">
+              <a:rPr lang="en-GB" sz="2400" b="0" i="0" u="none" strike="noStrike" cap="none" dirty="0">
                 <a:solidFill>
                   <a:schemeClr val="dk1"/>
                 </a:solidFill>
@@ -12052,7 +12053,7 @@
               <a:t>+ </a:t>
             </a:r>
             <a:r>
-              <a:rPr lang="en-GB" sz="2400" b="0" i="0" u="none" strike="noStrike" cap="none">
+              <a:rPr lang="en-GB" sz="2400" b="0" i="0" u="none" strike="noStrike" cap="none" dirty="0">
                 <a:solidFill>
                   <a:srgbClr val="0070C0"/>
                 </a:solidFill>
@@ -12064,7 +12065,7 @@
               <a:t>Parameters</a:t>
             </a:r>
             <a:r>
-              <a:rPr lang="en-GB" sz="2400" b="0" i="0" u="none" strike="noStrike" cap="none">
+              <a:rPr lang="en-GB" sz="2400" b="0" i="0" u="none" strike="noStrike" cap="none" dirty="0">
                 <a:solidFill>
                   <a:schemeClr val="dk1"/>
                 </a:solidFill>
@@ -12076,7 +12077,7 @@
               <a:t> + </a:t>
             </a:r>
             <a:r>
-              <a:rPr lang="en-GB" sz="2400" b="1" i="0" u="none" strike="noStrike" cap="none">
+              <a:rPr lang="en-GB" sz="2400" b="1" i="0" u="none" strike="noStrike" cap="none" dirty="0">
                 <a:solidFill>
                   <a:srgbClr val="FFC000"/>
                 </a:solidFill>
@@ -12088,7 +12089,7 @@
               <a:t>MODEL </a:t>
             </a:r>
             <a:r>
-              <a:rPr lang="en-GB" sz="2400" b="0" i="0" u="none" strike="noStrike" cap="none">
+              <a:rPr lang="en-GB" sz="2400" b="0" i="0" u="none" strike="noStrike" cap="none" dirty="0">
                 <a:solidFill>
                   <a:schemeClr val="dk1"/>
                 </a:solidFill>
@@ -12100,7 +12101,7 @@
               <a:t>+ </a:t>
             </a:r>
             <a:r>
-              <a:rPr lang="en-GB" sz="2400" b="0" i="0" u="none" strike="noStrike" cap="none">
+              <a:rPr lang="en-GB" sz="2400" b="0" i="0" u="none" strike="noStrike" cap="none" dirty="0" err="1">
                 <a:solidFill>
                   <a:srgbClr val="116F37"/>
                 </a:solidFill>
@@ -12109,7 +12110,19 @@
                 <a:cs typeface="Calibri"/>
                 <a:sym typeface="Calibri"/>
               </a:rPr>
-              <a:t>Monolix Task Properties</a:t>
+              <a:t>Monolix</a:t>
+            </a:r>
+            <a:r>
+              <a:rPr lang="en-GB" sz="2400" b="0" i="0" u="none" strike="noStrike" cap="none" dirty="0">
+                <a:solidFill>
+                  <a:srgbClr val="116F37"/>
+                </a:solidFill>
+                <a:latin typeface="Calibri"/>
+                <a:ea typeface="Calibri"/>
+                <a:cs typeface="Calibri"/>
+                <a:sym typeface="Calibri"/>
+              </a:rPr>
+              <a:t> Task Properties</a:t>
             </a:r>
           </a:p>
           <a:p>
@@ -12128,7 +12141,7 @@
               <a:buChar char="▪"/>
             </a:pPr>
             <a:r>
-              <a:rPr lang="en-GB" sz="2400" b="1" i="0" u="none" strike="noStrike" cap="none">
+              <a:rPr lang="en-GB" sz="2400" b="1" i="0" u="none" strike="noStrike" cap="none" dirty="0">
                 <a:solidFill>
                   <a:schemeClr val="dk1"/>
                 </a:solidFill>
@@ -12140,7 +12153,7 @@
               <a:t>Bayesian estimation</a:t>
             </a:r>
             <a:r>
-              <a:rPr lang="en-GB" sz="2400" b="0" i="0" u="none" strike="noStrike" cap="none">
+              <a:rPr lang="en-GB" sz="2400" b="0" i="0" u="none" strike="noStrike" cap="none" dirty="0">
                 <a:solidFill>
                   <a:schemeClr val="dk1"/>
                 </a:solidFill>
@@ -12152,7 +12165,7 @@
               <a:t> =</a:t>
             </a:r>
             <a:r>
-              <a:rPr lang="en-GB" sz="2400" b="0" i="0" u="none" strike="noStrike" cap="none">
+              <a:rPr lang="en-GB" sz="2400" b="0" i="0" u="none" strike="noStrike" cap="none" dirty="0">
                 <a:solidFill>
                   <a:srgbClr val="116F37"/>
                 </a:solidFill>
@@ -12164,7 +12177,7 @@
               <a:t> </a:t>
             </a:r>
             <a:r>
-              <a:rPr lang="en-GB" sz="2400" b="0" i="0" u="none" strike="noStrike" cap="none">
+              <a:rPr lang="en-GB" sz="2400" b="0" i="0" u="none" strike="noStrike" cap="none" dirty="0">
                 <a:solidFill>
                   <a:srgbClr val="FF66CC"/>
                 </a:solidFill>
@@ -12176,7 +12189,7 @@
               <a:t>Data </a:t>
             </a:r>
             <a:r>
-              <a:rPr lang="en-GB" sz="2400" b="0" i="0" u="none" strike="noStrike" cap="none">
+              <a:rPr lang="en-GB" sz="2400" b="0" i="0" u="none" strike="noStrike" cap="none" dirty="0">
                 <a:solidFill>
                   <a:srgbClr val="116F37"/>
                 </a:solidFill>
@@ -12188,7 +12201,7 @@
               <a:t>+ </a:t>
             </a:r>
             <a:r>
-              <a:rPr lang="en-GB" sz="2400" b="0" i="0" u="none" strike="noStrike" cap="none">
+              <a:rPr lang="en-GB" sz="2400" b="0" i="0" u="none" strike="noStrike" cap="none" dirty="0">
                 <a:solidFill>
                   <a:srgbClr val="7030A0"/>
                 </a:solidFill>
@@ -12200,7 +12213,7 @@
               <a:t>Priors</a:t>
             </a:r>
             <a:r>
-              <a:rPr lang="en-GB" sz="2400" b="0" i="0" u="none" strike="noStrike" cap="none">
+              <a:rPr lang="en-GB" sz="2400" b="0" i="0" u="none" strike="noStrike" cap="none" dirty="0">
                 <a:solidFill>
                   <a:srgbClr val="116F37"/>
                 </a:solidFill>
@@ -12212,7 +12225,7 @@
               <a:t> + </a:t>
             </a:r>
             <a:r>
-              <a:rPr lang="en-GB" sz="2400" b="1" i="0" u="none" strike="noStrike" cap="none">
+              <a:rPr lang="en-GB" sz="2400" b="1" i="0" u="none" strike="noStrike" cap="none" dirty="0">
                 <a:solidFill>
                   <a:srgbClr val="FFC000"/>
                 </a:solidFill>
@@ -12224,7 +12237,7 @@
               <a:t>MODEL </a:t>
             </a:r>
             <a:r>
-              <a:rPr lang="en-GB" sz="2400" b="0" i="0" u="none" strike="noStrike" cap="none">
+              <a:rPr lang="en-GB" sz="2400" b="0" i="0" u="none" strike="noStrike" cap="none" dirty="0">
                 <a:solidFill>
                   <a:srgbClr val="116F37"/>
                 </a:solidFill>
@@ -12252,7 +12265,7 @@
               <a:buChar char="▪"/>
             </a:pPr>
             <a:r>
-              <a:rPr lang="en-GB" sz="2400" b="1" i="0" u="none" strike="noStrike" cap="none">
+              <a:rPr lang="en-GB" sz="2400" b="1" i="0" u="none" strike="noStrike" cap="none" dirty="0">
                 <a:solidFill>
                   <a:schemeClr val="dk1"/>
                 </a:solidFill>
@@ -12264,7 +12277,7 @@
               <a:t>VPC</a:t>
             </a:r>
             <a:r>
-              <a:rPr lang="en-GB" sz="2400" b="0" i="0" u="none" strike="noStrike" cap="none">
+              <a:rPr lang="en-GB" sz="2400" b="0" i="0" u="none" strike="noStrike" cap="none" dirty="0">
                 <a:solidFill>
                   <a:schemeClr val="dk1"/>
                 </a:solidFill>
@@ -12276,7 +12289,7 @@
               <a:t> = </a:t>
             </a:r>
             <a:r>
-              <a:rPr lang="en-GB" sz="2400" b="0" i="0" u="none" strike="noStrike" cap="none">
+              <a:rPr lang="en-GB" sz="2400" b="0" i="0" u="none" strike="noStrike" cap="none" dirty="0">
                 <a:solidFill>
                   <a:srgbClr val="FF66CC"/>
                 </a:solidFill>
@@ -12288,7 +12301,7 @@
               <a:t>Data </a:t>
             </a:r>
             <a:r>
-              <a:rPr lang="en-GB" sz="2400" b="0" i="0" u="none" strike="noStrike" cap="none">
+              <a:rPr lang="en-GB" sz="2400" b="0" i="0" u="none" strike="noStrike" cap="none" dirty="0">
                 <a:solidFill>
                   <a:schemeClr val="dk1"/>
                 </a:solidFill>
@@ -12300,7 +12313,7 @@
               <a:t>+ </a:t>
             </a:r>
             <a:r>
-              <a:rPr lang="en-GB" sz="2400" b="0" i="0" u="none" strike="noStrike" cap="none">
+              <a:rPr lang="en-GB" sz="2400" b="0" i="0" u="none" strike="noStrike" cap="none" dirty="0">
                 <a:solidFill>
                   <a:srgbClr val="0070C0"/>
                 </a:solidFill>
@@ -12312,7 +12325,7 @@
               <a:t>Final Parameters </a:t>
             </a:r>
             <a:r>
-              <a:rPr lang="en-GB" sz="2400" b="0" i="0" u="none" strike="noStrike" cap="none">
+              <a:rPr lang="en-GB" sz="2400" b="0" i="0" u="none" strike="noStrike" cap="none" dirty="0">
                 <a:solidFill>
                   <a:schemeClr val="dk1"/>
                 </a:solidFill>
@@ -12324,7 +12337,7 @@
               <a:t>+ </a:t>
             </a:r>
             <a:r>
-              <a:rPr lang="en-GB" sz="2400" b="1" i="0" u="none" strike="noStrike" cap="none">
+              <a:rPr lang="en-GB" sz="2400" b="1" i="0" u="none" strike="noStrike" cap="none" dirty="0">
                 <a:solidFill>
                   <a:srgbClr val="FFC000"/>
                 </a:solidFill>
@@ -12336,7 +12349,7 @@
               <a:t>MODEL </a:t>
             </a:r>
             <a:r>
-              <a:rPr lang="en-GB" sz="2400" b="0" i="0" u="none" strike="noStrike" cap="none">
+              <a:rPr lang="en-GB" sz="2400" b="0" i="0" u="none" strike="noStrike" cap="none" dirty="0">
                 <a:solidFill>
                   <a:schemeClr val="dk1"/>
                 </a:solidFill>
@@ -12348,7 +12361,7 @@
               <a:t>+ </a:t>
             </a:r>
             <a:r>
-              <a:rPr lang="en-GB" sz="2400" b="0" i="0" u="none" strike="noStrike" cap="none">
+              <a:rPr lang="en-GB" sz="2400" b="0" i="0" u="none" strike="noStrike" cap="none" dirty="0">
                 <a:solidFill>
                   <a:srgbClr val="116F37"/>
                 </a:solidFill>
@@ -12358,6 +12371,153 @@
                 <a:sym typeface="Calibri"/>
               </a:rPr>
               <a:t>NONMEM Task Properties</a:t>
+            </a:r>
+          </a:p>
+          <a:p>
+            <a:pPr lvl="0">
+              <a:spcBef>
+                <a:spcPts val="960"/>
+              </a:spcBef>
+              <a:spcAft>
+                <a:spcPts val="0"/>
+              </a:spcAft>
+              <a:buSzPct val="100000"/>
+              <a:buFont typeface="Noto Sans Symbols"/>
+              <a:buChar char="▪"/>
+            </a:pPr>
+            <a:r>
+              <a:rPr lang="en-GB" sz="2400" b="1" i="0" u="none" strike="noStrike" cap="none">
+                <a:solidFill>
+                  <a:schemeClr val="dk1"/>
+                </a:solidFill>
+                <a:latin typeface="Calibri"/>
+                <a:ea typeface="Calibri"/>
+                <a:cs typeface="Calibri"/>
+                <a:sym typeface="Calibri"/>
+              </a:rPr>
+              <a:t>Prediction / simulation </a:t>
+            </a:r>
+            <a:r>
+              <a:rPr lang="en-GB" sz="2400" b="0" i="0" u="none" strike="noStrike" cap="none">
+                <a:solidFill>
+                  <a:schemeClr val="dk1"/>
+                </a:solidFill>
+                <a:latin typeface="Calibri"/>
+                <a:ea typeface="Calibri"/>
+                <a:cs typeface="Calibri"/>
+                <a:sym typeface="Calibri"/>
+              </a:rPr>
+              <a:t>= </a:t>
+            </a:r>
+            <a:r>
+              <a:rPr lang="en-GB" sz="2400" b="0" i="0" u="none" strike="noStrike" cap="none">
+                <a:solidFill>
+                  <a:srgbClr val="FF0000"/>
+                </a:solidFill>
+                <a:latin typeface="Calibri"/>
+                <a:ea typeface="Calibri"/>
+                <a:cs typeface="Calibri"/>
+                <a:sym typeface="Calibri"/>
+              </a:rPr>
+              <a:t>Design</a:t>
+            </a:r>
+            <a:r>
+              <a:rPr lang="en-GB" sz="2400" b="0" i="0" u="none" strike="noStrike" cap="none">
+                <a:solidFill>
+                  <a:schemeClr val="dk1"/>
+                </a:solidFill>
+                <a:latin typeface="Calibri"/>
+                <a:ea typeface="Calibri"/>
+                <a:cs typeface="Calibri"/>
+                <a:sym typeface="Calibri"/>
+              </a:rPr>
+              <a:t> </a:t>
+            </a:r>
+            <a:r>
+              <a:rPr lang="en-GB" b="1" i="1">
+                <a:ea typeface="Calibri"/>
+                <a:cs typeface="Calibri"/>
+                <a:sym typeface="Calibri"/>
+              </a:rPr>
+              <a:t>or</a:t>
+            </a:r>
+            <a:r>
+              <a:rPr lang="en-GB">
+                <a:ea typeface="Calibri"/>
+                <a:cs typeface="Calibri"/>
+                <a:sym typeface="Calibri"/>
+              </a:rPr>
+              <a:t> </a:t>
+            </a:r>
+            <a:r>
+              <a:rPr lang="en-GB">
+                <a:solidFill>
+                  <a:srgbClr val="FF66CC"/>
+                </a:solidFill>
+                <a:ea typeface="Calibri"/>
+                <a:cs typeface="Calibri"/>
+                <a:sym typeface="Calibri"/>
+              </a:rPr>
+              <a:t>Data</a:t>
+            </a:r>
+            <a:r>
+              <a:rPr lang="en-GB">
+                <a:solidFill>
+                  <a:schemeClr val="dk1"/>
+                </a:solidFill>
+                <a:ea typeface="Calibri"/>
+                <a:cs typeface="Calibri"/>
+                <a:sym typeface="Calibri"/>
+              </a:rPr>
+              <a:t> + </a:t>
+            </a:r>
+            <a:r>
+              <a:rPr lang="en-GB" sz="2400" b="0" i="0" u="none" strike="noStrike" cap="none">
+                <a:solidFill>
+                  <a:srgbClr val="0070C0"/>
+                </a:solidFill>
+                <a:latin typeface="Calibri"/>
+                <a:ea typeface="Calibri"/>
+                <a:cs typeface="Calibri"/>
+                <a:sym typeface="Calibri"/>
+              </a:rPr>
+              <a:t>Final Parameters </a:t>
+            </a:r>
+            <a:r>
+              <a:rPr lang="en-GB" sz="2400" b="0" i="0" u="none" strike="noStrike" cap="none">
+                <a:solidFill>
+                  <a:schemeClr val="dk1"/>
+                </a:solidFill>
+                <a:latin typeface="Calibri"/>
+                <a:ea typeface="Calibri"/>
+                <a:cs typeface="Calibri"/>
+                <a:sym typeface="Calibri"/>
+              </a:rPr>
+              <a:t>+ </a:t>
+            </a:r>
+            <a:r>
+              <a:rPr lang="en-GB" sz="2400" b="1" i="0" u="none" strike="noStrike" cap="none">
+                <a:solidFill>
+                  <a:srgbClr val="FFC000"/>
+                </a:solidFill>
+                <a:latin typeface="Calibri"/>
+                <a:ea typeface="Calibri"/>
+                <a:cs typeface="Calibri"/>
+                <a:sym typeface="Calibri"/>
+              </a:rPr>
+              <a:t>MODEL </a:t>
+            </a:r>
+            <a:r>
+              <a:rPr lang="en-GB" sz="2400" b="0" i="0" u="none" strike="noStrike" cap="none">
+                <a:solidFill>
+                  <a:srgbClr val="116F37"/>
+                </a:solidFill>
+                <a:latin typeface="Calibri"/>
+                <a:ea typeface="Calibri"/>
+                <a:cs typeface="Calibri"/>
+                <a:sym typeface="Calibri"/>
+              </a:rPr>
+              <a:t>+ Simulation Task Properties</a:t>
             </a:r>
           </a:p>
           <a:p>
@@ -12376,7 +12536,7 @@
               <a:buChar char="▪"/>
             </a:pPr>
             <a:r>
-              <a:rPr lang="en-GB" sz="2400" b="1" i="0" u="none" strike="noStrike" cap="none">
+              <a:rPr lang="en-GB" sz="2400" b="1" i="0" u="none" strike="noStrike" cap="none" dirty="0">
                 <a:solidFill>
                   <a:schemeClr val="dk1"/>
                 </a:solidFill>
@@ -12385,10 +12545,10 @@
                 <a:cs typeface="Calibri"/>
                 <a:sym typeface="Calibri"/>
               </a:rPr>
-              <a:t>Prediction / simulation </a:t>
-            </a:r>
-            <a:r>
-              <a:rPr lang="en-GB" sz="2400" b="0" i="0" u="none" strike="noStrike" cap="none">
+              <a:t>Optimal design / evaluation</a:t>
+            </a:r>
+            <a:r>
+              <a:rPr lang="en-GB" sz="2400" b="0" i="0" u="none" strike="noStrike" cap="none" dirty="0">
                 <a:solidFill>
                   <a:schemeClr val="dk1"/>
                 </a:solidFill>
@@ -12397,10 +12557,10 @@
                 <a:cs typeface="Calibri"/>
                 <a:sym typeface="Calibri"/>
               </a:rPr>
-              <a:t>= </a:t>
-            </a:r>
-            <a:r>
-              <a:rPr lang="en-GB" sz="2400" b="0" i="0" u="none" strike="noStrike" cap="none">
+              <a:t> = </a:t>
+            </a:r>
+            <a:r>
+              <a:rPr lang="en-GB" sz="2400" b="0" i="0" u="none" strike="noStrike" cap="none" dirty="0">
                 <a:solidFill>
                   <a:srgbClr val="FF0000"/>
                 </a:solidFill>
@@ -12412,7 +12572,7 @@
               <a:t>Design</a:t>
             </a:r>
             <a:r>
-              <a:rPr lang="en-GB" sz="2400" b="0" i="0" u="none" strike="noStrike" cap="none">
+              <a:rPr lang="en-GB" sz="2400" b="0" i="0" u="none" strike="noStrike" cap="none" dirty="0">
                 <a:solidFill>
                   <a:schemeClr val="dk1"/>
                 </a:solidFill>
@@ -12424,7 +12584,7 @@
               <a:t> + </a:t>
             </a:r>
             <a:r>
-              <a:rPr lang="en-GB" sz="2400" b="0" i="0" u="none" strike="noStrike" cap="none">
+              <a:rPr lang="en-GB" sz="2400" b="0" i="0" u="none" strike="noStrike" cap="none" dirty="0">
                 <a:solidFill>
                   <a:srgbClr val="0070C0"/>
                 </a:solidFill>
@@ -12436,7 +12596,7 @@
               <a:t>Final Parameters </a:t>
             </a:r>
             <a:r>
-              <a:rPr lang="en-GB" sz="2400" b="0" i="0" u="none" strike="noStrike" cap="none">
+              <a:rPr lang="en-GB" sz="2400" b="0" i="0" u="none" strike="noStrike" cap="none" dirty="0">
                 <a:solidFill>
                   <a:schemeClr val="dk1"/>
                 </a:solidFill>
@@ -12448,7 +12608,7 @@
               <a:t>+ </a:t>
             </a:r>
             <a:r>
-              <a:rPr lang="en-GB" sz="2400" b="1" i="0" u="none" strike="noStrike" cap="none">
+              <a:rPr lang="en-GB" sz="2400" b="1" i="0" u="none" strike="noStrike" cap="none" dirty="0">
                 <a:solidFill>
                   <a:srgbClr val="FFC000"/>
                 </a:solidFill>
@@ -12460,7 +12620,7 @@
               <a:t>MODEL </a:t>
             </a:r>
             <a:r>
-              <a:rPr lang="en-GB" sz="2400" b="0" i="0" u="none" strike="noStrike" cap="none">
+              <a:rPr lang="en-GB" sz="2400" b="0" i="0" u="none" strike="noStrike" cap="none" dirty="0">
                 <a:solidFill>
                   <a:srgbClr val="116F37"/>
                 </a:solidFill>
@@ -12469,119 +12629,31 @@
                 <a:cs typeface="Calibri"/>
                 <a:sym typeface="Calibri"/>
               </a:rPr>
-              <a:t>+ Simulation Task Properties</a:t>
-            </a:r>
-          </a:p>
-          <a:p>
-            <a:pPr marL="268288" marR="0" lvl="0" indent="-268288" algn="l" rtl="0">
-              <a:spcBef>
-                <a:spcPts val="960"/>
-              </a:spcBef>
-              <a:spcAft>
-                <a:spcPts val="0"/>
-              </a:spcAft>
-              <a:buClr>
-                <a:srgbClr val="009146"/>
-              </a:buClr>
-              <a:buSzPct val="100000"/>
-              <a:buFont typeface="Noto Sans Symbols"/>
-              <a:buChar char="▪"/>
-            </a:pPr>
-            <a:r>
-              <a:rPr lang="en-GB" sz="2400" b="1" i="0" u="none" strike="noStrike" cap="none">
-                <a:solidFill>
-                  <a:schemeClr val="dk1"/>
+              <a:t>+ PFIM / </a:t>
+            </a:r>
+            <a:r>
+              <a:rPr lang="en-GB" sz="2400" b="0" i="0" u="none" strike="noStrike" cap="none" dirty="0" err="1">
+                <a:solidFill>
+                  <a:srgbClr val="116F37"/>
                 </a:solidFill>
                 <a:latin typeface="Calibri"/>
                 <a:ea typeface="Calibri"/>
                 <a:cs typeface="Calibri"/>
                 <a:sym typeface="Calibri"/>
               </a:rPr>
-              <a:t>Optimal design / evaluation</a:t>
-            </a:r>
-            <a:r>
-              <a:rPr lang="en-GB" sz="2400" b="0" i="0" u="none" strike="noStrike" cap="none">
-                <a:solidFill>
-                  <a:schemeClr val="dk1"/>
+              <a:t>PopED</a:t>
+            </a:r>
+            <a:r>
+              <a:rPr lang="en-GB" sz="2400" b="0" i="0" u="none" strike="noStrike" cap="none" dirty="0">
+                <a:solidFill>
+                  <a:srgbClr val="116F37"/>
                 </a:solidFill>
                 <a:latin typeface="Calibri"/>
                 <a:ea typeface="Calibri"/>
                 <a:cs typeface="Calibri"/>
                 <a:sym typeface="Calibri"/>
               </a:rPr>
-              <a:t> = </a:t>
-            </a:r>
-            <a:r>
-              <a:rPr lang="en-GB" sz="2400" b="0" i="0" u="none" strike="noStrike" cap="none">
-                <a:solidFill>
-                  <a:srgbClr val="FF0000"/>
-                </a:solidFill>
-                <a:latin typeface="Calibri"/>
-                <a:ea typeface="Calibri"/>
-                <a:cs typeface="Calibri"/>
-                <a:sym typeface="Calibri"/>
-              </a:rPr>
-              <a:t>Design</a:t>
-            </a:r>
-            <a:r>
-              <a:rPr lang="en-GB" sz="2400" b="0" i="0" u="none" strike="noStrike" cap="none">
-                <a:solidFill>
-                  <a:schemeClr val="dk1"/>
-                </a:solidFill>
-                <a:latin typeface="Calibri"/>
-                <a:ea typeface="Calibri"/>
-                <a:cs typeface="Calibri"/>
-                <a:sym typeface="Calibri"/>
-              </a:rPr>
-              <a:t> + </a:t>
-            </a:r>
-            <a:r>
-              <a:rPr lang="en-GB" sz="2400" b="0" i="0" u="none" strike="noStrike" cap="none">
-                <a:solidFill>
-                  <a:srgbClr val="0070C0"/>
-                </a:solidFill>
-                <a:latin typeface="Calibri"/>
-                <a:ea typeface="Calibri"/>
-                <a:cs typeface="Calibri"/>
-                <a:sym typeface="Calibri"/>
-              </a:rPr>
-              <a:t>Final Parameters </a:t>
-            </a:r>
-            <a:r>
-              <a:rPr lang="en-GB" sz="2400" b="0" i="0" u="none" strike="noStrike" cap="none">
-                <a:solidFill>
-                  <a:schemeClr val="dk1"/>
-                </a:solidFill>
-                <a:latin typeface="Calibri"/>
-                <a:ea typeface="Calibri"/>
-                <a:cs typeface="Calibri"/>
-                <a:sym typeface="Calibri"/>
-              </a:rPr>
-              <a:t>+ </a:t>
-            </a:r>
-            <a:r>
-              <a:rPr lang="en-GB" sz="2400" b="1" i="0" u="none" strike="noStrike" cap="none">
-                <a:solidFill>
-                  <a:srgbClr val="FFC000"/>
-                </a:solidFill>
-                <a:latin typeface="Calibri"/>
-                <a:ea typeface="Calibri"/>
-                <a:cs typeface="Calibri"/>
-                <a:sym typeface="Calibri"/>
-              </a:rPr>
-              <a:t>MODEL </a:t>
-            </a:r>
-            <a:r>
-              <a:rPr lang="en-GB" sz="2400" b="0" i="0" u="none" strike="noStrike" cap="none">
-                <a:solidFill>
-                  <a:srgbClr val="116F37"/>
-                </a:solidFill>
-                <a:latin typeface="Calibri"/>
-                <a:ea typeface="Calibri"/>
-                <a:cs typeface="Calibri"/>
-                <a:sym typeface="Calibri"/>
-              </a:rPr>
-              <a:t>+ PFIM / PopED Task Properties</a:t>
+              <a:t> Task Properties</a:t>
             </a:r>
           </a:p>
         </p:txBody>
@@ -16388,22 +16460,14 @@
             <a:pPr lvl="1"/>
             <a:r>
               <a:rPr lang="en-GB" sz="1800" dirty="0" smtClean="0"/>
-              <a:t>Use </a:t>
-            </a:r>
+              <a:t>Use Case 5 – Specifying covariates, covariate transformations, categorical covariates</a:t>
+            </a:r>
+          </a:p>
+          <a:p>
+            <a:pPr lvl="1"/>
             <a:r>
               <a:rPr lang="en-GB" sz="1800" dirty="0" smtClean="0"/>
-              <a:t>Case 5 – Specifying covariates, covariate transformations, categorical covariates</a:t>
-            </a:r>
-          </a:p>
-          <a:p>
-            <a:pPr lvl="1"/>
-            <a:r>
-              <a:rPr lang="en-GB" sz="1800" dirty="0" smtClean="0"/>
-              <a:t>Exercise – fixing a “broken” </a:t>
-            </a:r>
-            <a:r>
-              <a:rPr lang="en-GB" sz="1800" dirty="0" smtClean="0"/>
-              <a:t>model</a:t>
+              <a:t>Exercise – fixing a “broken” model</a:t>
             </a:r>
           </a:p>
           <a:p>
@@ -16412,7 +16476,6 @@
               <a:rPr lang="en-GB" sz="1800" dirty="0" smtClean="0"/>
               <a:t>(Depending on time – UseCase4. Moving from ODEs to compartments and ensuring the models are equivalent)</a:t>
             </a:r>
-            <a:endParaRPr lang="en-GB" sz="1800" dirty="0" smtClean="0"/>
           </a:p>
           <a:p>
             <a:pPr lvl="1"/>
@@ -18004,7 +18067,7 @@
               <a:buChar char="▪"/>
             </a:pPr>
             <a:r>
-              <a:rPr lang="en-GB" sz="2400" b="1" i="0" u="none" strike="noStrike" cap="none">
+              <a:rPr lang="en-GB" sz="2400" b="1" i="0" u="none" strike="noStrike" cap="none" dirty="0">
                 <a:solidFill>
                   <a:schemeClr val="dk1"/>
                 </a:solidFill>
@@ -18016,7 +18079,7 @@
               <a:t>Estimation</a:t>
             </a:r>
             <a:r>
-              <a:rPr lang="en-GB" sz="2400" b="0" i="0" u="none" strike="noStrike" cap="none">
+              <a:rPr lang="en-GB" sz="2400" b="0" i="0" u="none" strike="noStrike" cap="none" dirty="0">
                 <a:solidFill>
                   <a:schemeClr val="dk1"/>
                 </a:solidFill>
@@ -18028,7 +18091,7 @@
               <a:t> = </a:t>
             </a:r>
             <a:r>
-              <a:rPr lang="en-GB" sz="2400" b="0" i="0" u="none" strike="noStrike" cap="none">
+              <a:rPr lang="en-GB" sz="2400" b="0" i="0" u="none" strike="noStrike" cap="none" dirty="0">
                 <a:solidFill>
                   <a:srgbClr val="FF66CC"/>
                 </a:solidFill>
@@ -18040,7 +18103,7 @@
               <a:t>Data </a:t>
             </a:r>
             <a:r>
-              <a:rPr lang="en-GB" sz="2400" b="0" i="0" u="none" strike="noStrike" cap="none">
+              <a:rPr lang="en-GB" sz="2400" b="0" i="0" u="none" strike="noStrike" cap="none" dirty="0">
                 <a:solidFill>
                   <a:schemeClr val="dk1"/>
                 </a:solidFill>
@@ -18052,7 +18115,7 @@
               <a:t>+ </a:t>
             </a:r>
             <a:r>
-              <a:rPr lang="en-GB" sz="2400" b="0" i="0" u="none" strike="noStrike" cap="none">
+              <a:rPr lang="en-GB" sz="2400" b="0" i="0" u="none" strike="noStrike" cap="none" dirty="0">
                 <a:solidFill>
                   <a:srgbClr val="0070C0"/>
                 </a:solidFill>
@@ -18064,7 +18127,7 @@
               <a:t>Parameters</a:t>
             </a:r>
             <a:r>
-              <a:rPr lang="en-GB" sz="2400" b="0" i="0" u="none" strike="noStrike" cap="none">
+              <a:rPr lang="en-GB" sz="2400" b="0" i="0" u="none" strike="noStrike" cap="none" dirty="0">
                 <a:solidFill>
                   <a:schemeClr val="dk1"/>
                 </a:solidFill>
@@ -18076,7 +18139,7 @@
               <a:t> + </a:t>
             </a:r>
             <a:r>
-              <a:rPr lang="en-GB" sz="2400" b="1" i="0" u="none" strike="noStrike" cap="none">
+              <a:rPr lang="en-GB" sz="2400" b="1" i="0" u="none" strike="noStrike" cap="none" dirty="0">
                 <a:solidFill>
                   <a:srgbClr val="FFC000"/>
                 </a:solidFill>
@@ -18088,7 +18151,7 @@
               <a:t>MODEL </a:t>
             </a:r>
             <a:r>
-              <a:rPr lang="en-GB" sz="2400" b="0" i="0" u="none" strike="noStrike" cap="none">
+              <a:rPr lang="en-GB" sz="2400" b="0" i="0" u="none" strike="noStrike" cap="none" dirty="0">
                 <a:solidFill>
                   <a:schemeClr val="dk1"/>
                 </a:solidFill>
@@ -18100,7 +18163,7 @@
               <a:t>+ </a:t>
             </a:r>
             <a:r>
-              <a:rPr lang="en-GB" sz="2400" b="0" i="0" u="none" strike="noStrike" cap="none">
+              <a:rPr lang="en-GB" sz="2400" b="0" i="0" u="none" strike="noStrike" cap="none" dirty="0" err="1">
                 <a:solidFill>
                   <a:srgbClr val="116F37"/>
                 </a:solidFill>
@@ -18109,7 +18172,19 @@
                 <a:cs typeface="Calibri"/>
                 <a:sym typeface="Calibri"/>
               </a:rPr>
-              <a:t>Monolix Task Properties</a:t>
+              <a:t>Monolix</a:t>
+            </a:r>
+            <a:r>
+              <a:rPr lang="en-GB" sz="2400" b="0" i="0" u="none" strike="noStrike" cap="none" dirty="0">
+                <a:solidFill>
+                  <a:srgbClr val="116F37"/>
+                </a:solidFill>
+                <a:latin typeface="Calibri"/>
+                <a:ea typeface="Calibri"/>
+                <a:cs typeface="Calibri"/>
+                <a:sym typeface="Calibri"/>
+              </a:rPr>
+              <a:t> Task Properties</a:t>
             </a:r>
           </a:p>
           <a:p>
@@ -18128,7 +18203,7 @@
               <a:buChar char="▪"/>
             </a:pPr>
             <a:r>
-              <a:rPr lang="en-GB" sz="2400" b="1" i="0" u="none" strike="noStrike" cap="none">
+              <a:rPr lang="en-GB" sz="2400" b="1" i="0" u="none" strike="noStrike" cap="none" dirty="0">
                 <a:solidFill>
                   <a:schemeClr val="dk1"/>
                 </a:solidFill>
@@ -18140,7 +18215,7 @@
               <a:t>Bayesian estimation</a:t>
             </a:r>
             <a:r>
-              <a:rPr lang="en-GB" sz="2400" b="0" i="0" u="none" strike="noStrike" cap="none">
+              <a:rPr lang="en-GB" sz="2400" b="0" i="0" u="none" strike="noStrike" cap="none" dirty="0">
                 <a:solidFill>
                   <a:schemeClr val="dk1"/>
                 </a:solidFill>
@@ -18152,7 +18227,7 @@
               <a:t> =</a:t>
             </a:r>
             <a:r>
-              <a:rPr lang="en-GB" sz="2400" b="0" i="0" u="none" strike="noStrike" cap="none">
+              <a:rPr lang="en-GB" sz="2400" b="0" i="0" u="none" strike="noStrike" cap="none" dirty="0">
                 <a:solidFill>
                   <a:srgbClr val="116F37"/>
                 </a:solidFill>
@@ -18164,7 +18239,7 @@
               <a:t> </a:t>
             </a:r>
             <a:r>
-              <a:rPr lang="en-GB" sz="2400" b="0" i="0" u="none" strike="noStrike" cap="none">
+              <a:rPr lang="en-GB" sz="2400" b="0" i="0" u="none" strike="noStrike" cap="none" dirty="0">
                 <a:solidFill>
                   <a:srgbClr val="FF66CC"/>
                 </a:solidFill>
@@ -18176,7 +18251,7 @@
               <a:t>Data </a:t>
             </a:r>
             <a:r>
-              <a:rPr lang="en-GB" sz="2400" b="0" i="0" u="none" strike="noStrike" cap="none">
+              <a:rPr lang="en-GB" sz="2400" b="0" i="0" u="none" strike="noStrike" cap="none" dirty="0">
                 <a:solidFill>
                   <a:srgbClr val="116F37"/>
                 </a:solidFill>
@@ -18188,7 +18263,7 @@
               <a:t>+ </a:t>
             </a:r>
             <a:r>
-              <a:rPr lang="en-GB" sz="2400" b="0" i="0" u="none" strike="noStrike" cap="none">
+              <a:rPr lang="en-GB" sz="2400" b="0" i="0" u="none" strike="noStrike" cap="none" dirty="0">
                 <a:solidFill>
                   <a:srgbClr val="7030A0"/>
                 </a:solidFill>
@@ -18200,7 +18275,7 @@
               <a:t>Priors</a:t>
             </a:r>
             <a:r>
-              <a:rPr lang="en-GB" sz="2400" b="0" i="0" u="none" strike="noStrike" cap="none">
+              <a:rPr lang="en-GB" sz="2400" b="0" i="0" u="none" strike="noStrike" cap="none" dirty="0">
                 <a:solidFill>
                   <a:srgbClr val="116F37"/>
                 </a:solidFill>
@@ -18212,7 +18287,7 @@
               <a:t> + </a:t>
             </a:r>
             <a:r>
-              <a:rPr lang="en-GB" sz="2400" b="1" i="0" u="none" strike="noStrike" cap="none">
+              <a:rPr lang="en-GB" sz="2400" b="1" i="0" u="none" strike="noStrike" cap="none" dirty="0">
                 <a:solidFill>
                   <a:srgbClr val="FFC000"/>
                 </a:solidFill>
@@ -18224,7 +18299,7 @@
               <a:t>MODEL </a:t>
             </a:r>
             <a:r>
-              <a:rPr lang="en-GB" sz="2400" b="0" i="0" u="none" strike="noStrike" cap="none">
+              <a:rPr lang="en-GB" sz="2400" b="0" i="0" u="none" strike="noStrike" cap="none" dirty="0">
                 <a:solidFill>
                   <a:srgbClr val="116F37"/>
                 </a:solidFill>
@@ -18252,7 +18327,7 @@
               <a:buChar char="▪"/>
             </a:pPr>
             <a:r>
-              <a:rPr lang="en-GB" sz="2400" b="1" i="0" u="none" strike="noStrike" cap="none">
+              <a:rPr lang="en-GB" sz="2400" b="1" i="0" u="none" strike="noStrike" cap="none" dirty="0">
                 <a:solidFill>
                   <a:schemeClr val="dk1"/>
                 </a:solidFill>
@@ -18264,7 +18339,7 @@
               <a:t>VPC</a:t>
             </a:r>
             <a:r>
-              <a:rPr lang="en-GB" sz="2400" b="0" i="0" u="none" strike="noStrike" cap="none">
+              <a:rPr lang="en-GB" sz="2400" b="0" i="0" u="none" strike="noStrike" cap="none" dirty="0">
                 <a:solidFill>
                   <a:schemeClr val="dk1"/>
                 </a:solidFill>
@@ -18276,7 +18351,7 @@
               <a:t> = </a:t>
             </a:r>
             <a:r>
-              <a:rPr lang="en-GB" sz="2400" b="0" i="0" u="none" strike="noStrike" cap="none">
+              <a:rPr lang="en-GB" sz="2400" b="0" i="0" u="none" strike="noStrike" cap="none" dirty="0">
                 <a:solidFill>
                   <a:srgbClr val="FF66CC"/>
                 </a:solidFill>
@@ -18288,7 +18363,7 @@
               <a:t>Data </a:t>
             </a:r>
             <a:r>
-              <a:rPr lang="en-GB" sz="2400" b="0" i="0" u="none" strike="noStrike" cap="none">
+              <a:rPr lang="en-GB" sz="2400" b="0" i="0" u="none" strike="noStrike" cap="none" dirty="0">
                 <a:solidFill>
                   <a:schemeClr val="dk1"/>
                 </a:solidFill>
@@ -18300,7 +18375,7 @@
               <a:t>+ </a:t>
             </a:r>
             <a:r>
-              <a:rPr lang="en-GB" sz="2400" b="0" i="0" u="none" strike="noStrike" cap="none">
+              <a:rPr lang="en-GB" sz="2400" b="0" i="0" u="none" strike="noStrike" cap="none" dirty="0">
                 <a:solidFill>
                   <a:srgbClr val="0070C0"/>
                 </a:solidFill>
@@ -18312,7 +18387,7 @@
               <a:t>Final Parameters </a:t>
             </a:r>
             <a:r>
-              <a:rPr lang="en-GB" sz="2400" b="0" i="0" u="none" strike="noStrike" cap="none">
+              <a:rPr lang="en-GB" sz="2400" b="0" i="0" u="none" strike="noStrike" cap="none" dirty="0">
                 <a:solidFill>
                   <a:schemeClr val="dk1"/>
                 </a:solidFill>
@@ -18324,7 +18399,7 @@
               <a:t>+ </a:t>
             </a:r>
             <a:r>
-              <a:rPr lang="en-GB" sz="2400" b="1" i="0" u="none" strike="noStrike" cap="none">
+              <a:rPr lang="en-GB" sz="2400" b="1" i="0" u="none" strike="noStrike" cap="none" dirty="0">
                 <a:solidFill>
                   <a:srgbClr val="FFC000"/>
                 </a:solidFill>
@@ -18336,7 +18411,7 @@
               <a:t>MODEL </a:t>
             </a:r>
             <a:r>
-              <a:rPr lang="en-GB" sz="2400" b="0" i="0" u="none" strike="noStrike" cap="none">
+              <a:rPr lang="en-GB" sz="2400" b="0" i="0" u="none" strike="noStrike" cap="none" dirty="0">
                 <a:solidFill>
                   <a:schemeClr val="dk1"/>
                 </a:solidFill>
@@ -18348,7 +18423,7 @@
               <a:t>+ </a:t>
             </a:r>
             <a:r>
-              <a:rPr lang="en-GB" sz="2400" b="0" i="0" u="none" strike="noStrike" cap="none">
+              <a:rPr lang="en-GB" sz="2400" b="0" i="0" u="none" strike="noStrike" cap="none" dirty="0">
                 <a:solidFill>
                   <a:srgbClr val="116F37"/>
                 </a:solidFill>
@@ -18358,6 +18433,156 @@
                 <a:sym typeface="Calibri"/>
               </a:rPr>
               <a:t>NONMEM Task Properties</a:t>
+            </a:r>
+          </a:p>
+          <a:p>
+            <a:pPr lvl="0">
+              <a:spcBef>
+                <a:spcPts val="960"/>
+              </a:spcBef>
+              <a:spcAft>
+                <a:spcPts val="0"/>
+              </a:spcAft>
+              <a:buSzPct val="100000"/>
+              <a:buFont typeface="Noto Sans Symbols"/>
+              <a:buChar char="▪"/>
+            </a:pPr>
+            <a:r>
+              <a:rPr lang="en-GB" sz="2400" b="1" i="0" u="none" strike="noStrike" cap="none" dirty="0">
+                <a:solidFill>
+                  <a:schemeClr val="dk1"/>
+                </a:solidFill>
+                <a:latin typeface="Calibri"/>
+                <a:ea typeface="Calibri"/>
+                <a:cs typeface="Calibri"/>
+                <a:sym typeface="Calibri"/>
+              </a:rPr>
+              <a:t>Prediction / simulation </a:t>
+            </a:r>
+            <a:r>
+              <a:rPr lang="en-GB" sz="2400" b="0" i="0" u="none" strike="noStrike" cap="none" dirty="0">
+                <a:solidFill>
+                  <a:schemeClr val="dk1"/>
+                </a:solidFill>
+                <a:latin typeface="Calibri"/>
+                <a:ea typeface="Calibri"/>
+                <a:cs typeface="Calibri"/>
+                <a:sym typeface="Calibri"/>
+              </a:rPr>
+              <a:t>= </a:t>
+            </a:r>
+            <a:r>
+              <a:rPr lang="en-GB" sz="2400" b="0" i="0" u="none" strike="noStrike" cap="none" dirty="0" smtClean="0">
+                <a:solidFill>
+                  <a:srgbClr val="FF0000"/>
+                </a:solidFill>
+                <a:latin typeface="Calibri"/>
+                <a:ea typeface="Calibri"/>
+                <a:cs typeface="Calibri"/>
+                <a:sym typeface="Calibri"/>
+              </a:rPr>
+              <a:t>Design </a:t>
+            </a:r>
+            <a:r>
+              <a:rPr lang="en-GB" sz="2400" b="1" i="1" u="none" strike="noStrike" cap="none" dirty="0" smtClean="0">
+                <a:latin typeface="Calibri"/>
+                <a:ea typeface="Calibri"/>
+                <a:cs typeface="Calibri"/>
+                <a:sym typeface="Calibri"/>
+              </a:rPr>
+              <a:t>or</a:t>
+            </a:r>
+            <a:r>
+              <a:rPr lang="en-GB" sz="2400" b="0" i="0" u="none" strike="noStrike" cap="none" dirty="0" smtClean="0">
+                <a:latin typeface="Calibri"/>
+                <a:ea typeface="Calibri"/>
+                <a:cs typeface="Calibri"/>
+                <a:sym typeface="Calibri"/>
+              </a:rPr>
+              <a:t> </a:t>
+            </a:r>
+            <a:r>
+              <a:rPr lang="en-GB" dirty="0">
+                <a:solidFill>
+                  <a:srgbClr val="FF66CC"/>
+                </a:solidFill>
+                <a:ea typeface="Calibri"/>
+                <a:cs typeface="Calibri"/>
+                <a:sym typeface="Calibri"/>
+              </a:rPr>
+              <a:t>Data</a:t>
+            </a:r>
+            <a:r>
+              <a:rPr lang="en-GB" sz="2400" b="0" i="0" u="none" strike="noStrike" cap="none" dirty="0" smtClean="0">
+                <a:solidFill>
+                  <a:schemeClr val="dk1"/>
+                </a:solidFill>
+                <a:latin typeface="Calibri"/>
+                <a:ea typeface="Calibri"/>
+                <a:cs typeface="Calibri"/>
+                <a:sym typeface="Calibri"/>
+              </a:rPr>
+              <a:t> </a:t>
+            </a:r>
+            <a:r>
+              <a:rPr lang="en-GB" sz="2400" b="0" i="0" u="none" strike="noStrike" cap="none" dirty="0">
+                <a:solidFill>
+                  <a:schemeClr val="dk1"/>
+                </a:solidFill>
+                <a:latin typeface="Calibri"/>
+                <a:ea typeface="Calibri"/>
+                <a:cs typeface="Calibri"/>
+                <a:sym typeface="Calibri"/>
+              </a:rPr>
+              <a:t>+ </a:t>
+            </a:r>
+            <a:r>
+              <a:rPr lang="en-GB" sz="2400" b="0" i="0" u="none" strike="noStrike" cap="none" dirty="0">
+                <a:solidFill>
+                  <a:srgbClr val="0070C0"/>
+                </a:solidFill>
+                <a:latin typeface="Calibri"/>
+                <a:ea typeface="Calibri"/>
+                <a:cs typeface="Calibri"/>
+                <a:sym typeface="Calibri"/>
+              </a:rPr>
+              <a:t>Final Parameters </a:t>
+            </a:r>
+            <a:r>
+              <a:rPr lang="en-GB" sz="2400" b="0" i="0" u="none" strike="noStrike" cap="none" dirty="0">
+                <a:solidFill>
+                  <a:schemeClr val="dk1"/>
+                </a:solidFill>
+                <a:latin typeface="Calibri"/>
+                <a:ea typeface="Calibri"/>
+                <a:cs typeface="Calibri"/>
+                <a:sym typeface="Calibri"/>
+              </a:rPr>
+              <a:t>+ </a:t>
+            </a:r>
+            <a:r>
+              <a:rPr lang="en-GB" sz="2400" b="1" i="0" u="none" strike="noStrike" cap="none" dirty="0">
+                <a:solidFill>
+                  <a:srgbClr val="FFC000"/>
+                </a:solidFill>
+                <a:latin typeface="Calibri"/>
+                <a:ea typeface="Calibri"/>
+                <a:cs typeface="Calibri"/>
+                <a:sym typeface="Calibri"/>
+              </a:rPr>
+              <a:t>MODEL </a:t>
+            </a:r>
+            <a:r>
+              <a:rPr lang="en-GB" sz="2400" b="0" i="0" u="none" strike="noStrike" cap="none" dirty="0">
+                <a:solidFill>
+                  <a:srgbClr val="116F37"/>
+                </a:solidFill>
+                <a:latin typeface="Calibri"/>
+                <a:ea typeface="Calibri"/>
+                <a:cs typeface="Calibri"/>
+                <a:sym typeface="Calibri"/>
+              </a:rPr>
+              <a:t>+ Simulation Task Properties</a:t>
             </a:r>
           </a:p>
           <a:p>
@@ -18376,7 +18601,7 @@
               <a:buChar char="▪"/>
             </a:pPr>
             <a:r>
-              <a:rPr lang="en-GB" sz="2400" b="1" i="0" u="none" strike="noStrike" cap="none">
+              <a:rPr lang="en-GB" sz="2400" b="1" i="0" u="none" strike="noStrike" cap="none" dirty="0">
                 <a:solidFill>
                   <a:schemeClr val="dk1"/>
                 </a:solidFill>
@@ -18385,10 +18610,10 @@
                 <a:cs typeface="Calibri"/>
                 <a:sym typeface="Calibri"/>
               </a:rPr>
-              <a:t>Prediction / simulation </a:t>
-            </a:r>
-            <a:r>
-              <a:rPr lang="en-GB" sz="2400" b="0" i="0" u="none" strike="noStrike" cap="none">
+              <a:t>Optimal design / evaluation</a:t>
+            </a:r>
+            <a:r>
+              <a:rPr lang="en-GB" sz="2400" b="0" i="0" u="none" strike="noStrike" cap="none" dirty="0">
                 <a:solidFill>
                   <a:schemeClr val="dk1"/>
                 </a:solidFill>
@@ -18397,10 +18622,10 @@
                 <a:cs typeface="Calibri"/>
                 <a:sym typeface="Calibri"/>
               </a:rPr>
-              <a:t>= </a:t>
-            </a:r>
-            <a:r>
-              <a:rPr lang="en-GB" sz="2400" b="0" i="0" u="none" strike="noStrike" cap="none">
+              <a:t> = </a:t>
+            </a:r>
+            <a:r>
+              <a:rPr lang="en-GB" sz="2400" b="0" i="0" u="none" strike="noStrike" cap="none" dirty="0">
                 <a:solidFill>
                   <a:srgbClr val="FF0000"/>
                 </a:solidFill>
@@ -18412,7 +18637,7 @@
               <a:t>Design</a:t>
             </a:r>
             <a:r>
-              <a:rPr lang="en-GB" sz="2400" b="0" i="0" u="none" strike="noStrike" cap="none">
+              <a:rPr lang="en-GB" sz="2400" b="0" i="0" u="none" strike="noStrike" cap="none" dirty="0">
                 <a:solidFill>
                   <a:schemeClr val="dk1"/>
                 </a:solidFill>
@@ -18424,7 +18649,7 @@
               <a:t> + </a:t>
             </a:r>
             <a:r>
-              <a:rPr lang="en-GB" sz="2400" b="0" i="0" u="none" strike="noStrike" cap="none">
+              <a:rPr lang="en-GB" sz="2400" b="0" i="0" u="none" strike="noStrike" cap="none" dirty="0">
                 <a:solidFill>
                   <a:srgbClr val="0070C0"/>
                 </a:solidFill>
@@ -18436,7 +18661,7 @@
               <a:t>Final Parameters </a:t>
             </a:r>
             <a:r>
-              <a:rPr lang="en-GB" sz="2400" b="0" i="0" u="none" strike="noStrike" cap="none">
+              <a:rPr lang="en-GB" sz="2400" b="0" i="0" u="none" strike="noStrike" cap="none" dirty="0">
                 <a:solidFill>
                   <a:schemeClr val="dk1"/>
                 </a:solidFill>
@@ -18448,7 +18673,7 @@
               <a:t>+ </a:t>
             </a:r>
             <a:r>
-              <a:rPr lang="en-GB" sz="2400" b="1" i="0" u="none" strike="noStrike" cap="none">
+              <a:rPr lang="en-GB" sz="2400" b="1" i="0" u="none" strike="noStrike" cap="none" dirty="0">
                 <a:solidFill>
                   <a:srgbClr val="FFC000"/>
                 </a:solidFill>
@@ -18460,7 +18685,7 @@
               <a:t>MODEL </a:t>
             </a:r>
             <a:r>
-              <a:rPr lang="en-GB" sz="2400" b="0" i="0" u="none" strike="noStrike" cap="none">
+              <a:rPr lang="en-GB" sz="2400" b="0" i="0" u="none" strike="noStrike" cap="none" dirty="0">
                 <a:solidFill>
                   <a:srgbClr val="116F37"/>
                 </a:solidFill>
@@ -18469,119 +18694,31 @@
                 <a:cs typeface="Calibri"/>
                 <a:sym typeface="Calibri"/>
               </a:rPr>
-              <a:t>+ Simulation Task Properties</a:t>
-            </a:r>
-          </a:p>
-          <a:p>
-            <a:pPr marL="268288" marR="0" lvl="0" indent="-268288" algn="l" rtl="0">
-              <a:spcBef>
-                <a:spcPts val="960"/>
-              </a:spcBef>
-              <a:spcAft>
-                <a:spcPts val="0"/>
-              </a:spcAft>
-              <a:buClr>
-                <a:srgbClr val="009146"/>
-              </a:buClr>
-              <a:buSzPct val="100000"/>
-              <a:buFont typeface="Noto Sans Symbols"/>
-              <a:buChar char="▪"/>
-            </a:pPr>
-            <a:r>
-              <a:rPr lang="en-GB" sz="2400" b="1" i="0" u="none" strike="noStrike" cap="none">
-                <a:solidFill>
-                  <a:schemeClr val="dk1"/>
+              <a:t>+ PFIM / </a:t>
+            </a:r>
+            <a:r>
+              <a:rPr lang="en-GB" sz="2400" b="0" i="0" u="none" strike="noStrike" cap="none" dirty="0" err="1">
+                <a:solidFill>
+                  <a:srgbClr val="116F37"/>
                 </a:solidFill>
                 <a:latin typeface="Calibri"/>
                 <a:ea typeface="Calibri"/>
                 <a:cs typeface="Calibri"/>
                 <a:sym typeface="Calibri"/>
               </a:rPr>
-              <a:t>Optimal design / evaluation</a:t>
-            </a:r>
-            <a:r>
-              <a:rPr lang="en-GB" sz="2400" b="0" i="0" u="none" strike="noStrike" cap="none">
-                <a:solidFill>
-                  <a:schemeClr val="dk1"/>
+              <a:t>PopED</a:t>
+            </a:r>
+            <a:r>
+              <a:rPr lang="en-GB" sz="2400" b="0" i="0" u="none" strike="noStrike" cap="none" dirty="0">
+                <a:solidFill>
+                  <a:srgbClr val="116F37"/>
                 </a:solidFill>
                 <a:latin typeface="Calibri"/>
                 <a:ea typeface="Calibri"/>
                 <a:cs typeface="Calibri"/>
                 <a:sym typeface="Calibri"/>
               </a:rPr>
-              <a:t> = </a:t>
-            </a:r>
-            <a:r>
-              <a:rPr lang="en-GB" sz="2400" b="0" i="0" u="none" strike="noStrike" cap="none">
-                <a:solidFill>
-                  <a:srgbClr val="FF0000"/>
-                </a:solidFill>
-                <a:latin typeface="Calibri"/>
-                <a:ea typeface="Calibri"/>
-                <a:cs typeface="Calibri"/>
-                <a:sym typeface="Calibri"/>
-              </a:rPr>
-              <a:t>Design</a:t>
-            </a:r>
-            <a:r>
-              <a:rPr lang="en-GB" sz="2400" b="0" i="0" u="none" strike="noStrike" cap="none">
-                <a:solidFill>
-                  <a:schemeClr val="dk1"/>
-                </a:solidFill>
-                <a:latin typeface="Calibri"/>
-                <a:ea typeface="Calibri"/>
-                <a:cs typeface="Calibri"/>
-                <a:sym typeface="Calibri"/>
-              </a:rPr>
-              <a:t> + </a:t>
-            </a:r>
-            <a:r>
-              <a:rPr lang="en-GB" sz="2400" b="0" i="0" u="none" strike="noStrike" cap="none">
-                <a:solidFill>
-                  <a:srgbClr val="0070C0"/>
-                </a:solidFill>
-                <a:latin typeface="Calibri"/>
-                <a:ea typeface="Calibri"/>
-                <a:cs typeface="Calibri"/>
-                <a:sym typeface="Calibri"/>
-              </a:rPr>
-              <a:t>Final Parameters </a:t>
-            </a:r>
-            <a:r>
-              <a:rPr lang="en-GB" sz="2400" b="0" i="0" u="none" strike="noStrike" cap="none">
-                <a:solidFill>
-                  <a:schemeClr val="dk1"/>
-                </a:solidFill>
-                <a:latin typeface="Calibri"/>
-                <a:ea typeface="Calibri"/>
-                <a:cs typeface="Calibri"/>
-                <a:sym typeface="Calibri"/>
-              </a:rPr>
-              <a:t>+ </a:t>
-            </a:r>
-            <a:r>
-              <a:rPr lang="en-GB" sz="2400" b="1" i="0" u="none" strike="noStrike" cap="none">
-                <a:solidFill>
-                  <a:srgbClr val="FFC000"/>
-                </a:solidFill>
-                <a:latin typeface="Calibri"/>
-                <a:ea typeface="Calibri"/>
-                <a:cs typeface="Calibri"/>
-                <a:sym typeface="Calibri"/>
-              </a:rPr>
-              <a:t>MODEL </a:t>
-            </a:r>
-            <a:r>
-              <a:rPr lang="en-GB" sz="2400" b="0" i="0" u="none" strike="noStrike" cap="none">
-                <a:solidFill>
-                  <a:srgbClr val="116F37"/>
-                </a:solidFill>
-                <a:latin typeface="Calibri"/>
-                <a:ea typeface="Calibri"/>
-                <a:cs typeface="Calibri"/>
-                <a:sym typeface="Calibri"/>
-              </a:rPr>
-              <a:t>+ PFIM / PopED Task Properties</a:t>
+              <a:t> Task Properties</a:t>
             </a:r>
           </a:p>
         </p:txBody>
@@ -25783,8 +25920,12 @@
           <a:p>
             <a:pPr lvl="1"/>
             <a:r>
+              <a:rPr lang="en-GB" smtClean="0"/>
+              <a:t>understand </a:t>
+            </a:r>
+            <a:r>
               <a:rPr lang="en-GB" dirty="0" smtClean="0"/>
-              <a:t>be understand MDL grammar and constructs well enough to be able to use the MDL User Guide to help encode more intermediate / advanced features in MDL.</a:t>
+              <a:t>MDL grammar and constructs well enough to be able to use the MDL User Guide to help encode more intermediate / advanced features in MDL.</a:t>
             </a:r>
             <a:endParaRPr lang="en-GB" dirty="0"/>
           </a:p>
@@ -28400,11 +28541,7 @@
           <a:p>
             <a:r>
               <a:rPr lang="en-GB" dirty="0" smtClean="0"/>
-              <a:t>Recap: Agenda </a:t>
-            </a:r>
-            <a:r>
-              <a:rPr lang="en-GB" dirty="0" smtClean="0"/>
-              <a:t>(2)</a:t>
+              <a:t>Recap: Agenda (2)</a:t>
             </a:r>
             <a:endParaRPr lang="en-GB" dirty="0"/>
           </a:p>
@@ -28468,11 +28605,7 @@
             </a:r>
             <a:r>
               <a:rPr lang="en-GB" sz="1400" dirty="0" smtClean="0"/>
-              <a:t> </a:t>
-            </a:r>
-            <a:r>
-              <a:rPr lang="en-GB" sz="1400" dirty="0" smtClean="0"/>
-              <a:t>5 example</a:t>
+              <a:t> 5 example</a:t>
             </a:r>
           </a:p>
           <a:p>
@@ -28486,11 +28619,7 @@
             <a:pPr lvl="1"/>
             <a:r>
               <a:rPr lang="en-GB" sz="1600" dirty="0" smtClean="0"/>
-              <a:t>Random </a:t>
-            </a:r>
-            <a:r>
-              <a:rPr lang="en-GB" sz="1600" dirty="0" smtClean="0"/>
-              <a:t>variable definition &amp; </a:t>
+              <a:t>Random variable definition &amp; </a:t>
             </a:r>
             <a:r>
               <a:rPr lang="en-GB" sz="1600" dirty="0" err="1" smtClean="0"/>
@@ -28502,22 +28631,14 @@
             <a:pPr lvl="1"/>
             <a:r>
               <a:rPr lang="en-GB" sz="1600" dirty="0" smtClean="0"/>
-              <a:t>Category </a:t>
-            </a:r>
-            <a:r>
-              <a:rPr lang="en-GB" sz="1600" dirty="0" smtClean="0"/>
-              <a:t>definition</a:t>
+              <a:t>Category definition</a:t>
             </a:r>
           </a:p>
           <a:p>
             <a:pPr lvl="2"/>
             <a:r>
               <a:rPr lang="en-GB" sz="1400" dirty="0" smtClean="0"/>
-              <a:t>Non-continuous outcomes e.g. </a:t>
-            </a:r>
-            <a:r>
-              <a:rPr lang="en-GB" sz="1400" dirty="0" smtClean="0"/>
-              <a:t>Categorical (</a:t>
+              <a:t>Non-continuous outcomes e.g. Categorical (</a:t>
             </a:r>
             <a:r>
               <a:rPr lang="en-GB" sz="1400" dirty="0" err="1" smtClean="0"/>
@@ -28527,7 +28648,6 @@
               <a:rPr lang="en-GB" sz="1400" dirty="0" smtClean="0"/>
               <a:t> 13)</a:t>
             </a:r>
-            <a:endParaRPr lang="en-GB" sz="1400" dirty="0" smtClean="0"/>
           </a:p>
           <a:p>
             <a:pPr lvl="1"/>
@@ -28540,17 +28660,8 @@
             <a:pPr lvl="2"/>
             <a:r>
               <a:rPr lang="en-GB" sz="1400" dirty="0" smtClean="0"/>
-              <a:t>Properly dealing with multiple outcomes WITHOUT using </a:t>
-            </a:r>
-            <a:r>
-              <a:rPr lang="en-GB" sz="1400" dirty="0" smtClean="0"/>
-              <a:t>DVID (UseCase</a:t>
-            </a:r>
-            <a:r>
-              <a:rPr lang="en-GB" sz="1400" dirty="0" smtClean="0"/>
-              <a:t>3)</a:t>
-            </a:r>
-            <a:endParaRPr lang="en-GB" sz="1400" dirty="0" smtClean="0"/>
+              <a:t>Properly dealing with multiple outcomes WITHOUT using DVID (UseCase3)</a:t>
+            </a:r>
           </a:p>
           <a:p>
             <a:pPr lvl="2"/>
@@ -28584,11 +28695,7 @@
             <a:pPr lvl="2"/>
             <a:r>
               <a:rPr lang="en-GB" sz="1400" dirty="0" smtClean="0"/>
-              <a:t>MDL User </a:t>
-            </a:r>
-            <a:r>
-              <a:rPr lang="en-GB" sz="1400" dirty="0" smtClean="0"/>
-              <a:t>Guide</a:t>
+              <a:t>MDL User Guide</a:t>
             </a:r>
           </a:p>
           <a:p>
@@ -28597,7 +28704,6 @@
               <a:rPr lang="en-GB" sz="1400" dirty="0" smtClean="0"/>
               <a:t>MDL Reference Guide</a:t>
             </a:r>
-            <a:endParaRPr lang="en-GB" sz="1400" dirty="0" smtClean="0"/>
           </a:p>
           <a:p>
             <a:pPr lvl="1"/>
@@ -37335,6 +37441,24 @@
             <a:r>
               <a:rPr lang="en-GB" dirty="0" smtClean="0"/>
               <a:t>XML standard for modelling and simulation output.</a:t>
+            </a:r>
+          </a:p>
+          <a:p>
+            <a:pPr lvl="1"/>
+            <a:endParaRPr lang="en-GB" dirty="0"/>
+          </a:p>
+          <a:p>
+            <a:r>
+              <a:rPr lang="en-GB" dirty="0" smtClean="0"/>
+              <a:t>All </a:t>
+            </a:r>
+            <a:r>
+              <a:rPr lang="en-GB" dirty="0" err="1" smtClean="0"/>
+              <a:t>DDMoRe</a:t>
+            </a:r>
+            <a:r>
+              <a:rPr lang="en-GB" dirty="0" smtClean="0"/>
+              <a:t> standards are Open Source</a:t>
             </a:r>
           </a:p>
           <a:p>
@@ -39946,7 +40070,15 @@
           <a:bodyPr/>
           <a:lstStyle/>
           <a:p>
-            <a:endParaRPr lang="en-GB"/>
+            <a:r>
+              <a:rPr lang="en-GB" dirty="0" err="1" smtClean="0"/>
+              <a:t>DDMoRe</a:t>
+            </a:r>
+            <a:r>
+              <a:rPr lang="en-GB" dirty="0" smtClean="0"/>
+              <a:t> Language Standards</a:t>
+            </a:r>
+            <a:endParaRPr lang="en-GB" dirty="0"/>
           </a:p>
         </p:txBody>
       </p:sp>
@@ -39965,7 +40097,78 @@
           <a:bodyPr/>
           <a:lstStyle/>
           <a:p>
-            <a:endParaRPr lang="en-GB"/>
+            <a:r>
+              <a:rPr lang="en-GB" dirty="0" smtClean="0"/>
+              <a:t>All </a:t>
+            </a:r>
+            <a:r>
+              <a:rPr lang="en-GB" dirty="0" err="1" smtClean="0"/>
+              <a:t>DDMoRe</a:t>
+            </a:r>
+            <a:r>
+              <a:rPr lang="en-GB" dirty="0" smtClean="0"/>
+              <a:t> standards are open for the community to contribute.</a:t>
+            </a:r>
+          </a:p>
+          <a:p>
+            <a:r>
+              <a:rPr lang="en-GB" dirty="0" smtClean="0"/>
+              <a:t>What features are missing from MDL that YOU would like to see?</a:t>
+            </a:r>
+          </a:p>
+          <a:p>
+            <a:pPr lvl="1"/>
+            <a:r>
+              <a:rPr lang="en-GB" dirty="0" smtClean="0"/>
+              <a:t>BLQ handling</a:t>
+            </a:r>
+          </a:p>
+          <a:p>
+            <a:pPr lvl="1"/>
+            <a:r>
+              <a:rPr lang="en-GB" dirty="0" smtClean="0"/>
+              <a:t>“L2” handling</a:t>
+            </a:r>
+          </a:p>
+          <a:p>
+            <a:pPr lvl="1"/>
+            <a:r>
+              <a:rPr lang="en-GB" dirty="0" smtClean="0"/>
+              <a:t>Markov models</a:t>
+            </a:r>
+          </a:p>
+          <a:p>
+            <a:pPr lvl="1"/>
+            <a:r>
+              <a:rPr lang="en-GB" dirty="0" smtClean="0"/>
+              <a:t>…?</a:t>
+            </a:r>
+          </a:p>
+          <a:p>
+            <a:r>
+              <a:rPr lang="en-GB" dirty="0" smtClean="0"/>
+              <a:t>Submit suggestions to GitHub:</a:t>
+            </a:r>
+          </a:p>
+          <a:p>
+            <a:pPr lvl="1"/>
+            <a:r>
+              <a:rPr lang="en-GB" dirty="0">
+                <a:hlinkClick r:id="rId2"/>
+              </a:rPr>
+              <a:t>https://</a:t>
+            </a:r>
+            <a:r>
+              <a:rPr lang="en-GB" dirty="0" smtClean="0">
+                <a:hlinkClick r:id="rId2"/>
+              </a:rPr>
+              <a:t>github.com/ModelDefinitionLanguage/website/issues</a:t>
+            </a:r>
+            <a:r>
+              <a:rPr lang="en-GB" dirty="0" smtClean="0"/>
+              <a:t> </a:t>
+            </a:r>
+            <a:endParaRPr lang="en-GB" dirty="0"/>
           </a:p>
         </p:txBody>
       </p:sp>
@@ -40005,6 +40208,131 @@
                 <a:sym typeface="Calibri"/>
               </a:rPr>
               <a:t>64</a:t>
+            </a:fld>
+            <a:endParaRPr lang="en-GB" sz="1000" b="0" i="0" u="none" strike="noStrike" cap="none">
+              <a:solidFill>
+                <a:schemeClr val="dk1"/>
+              </a:solidFill>
+              <a:latin typeface="Calibri"/>
+              <a:ea typeface="Calibri"/>
+              <a:cs typeface="Calibri"/>
+              <a:sym typeface="Calibri"/>
+            </a:endParaRPr>
+          </a:p>
+        </p:txBody>
+      </p:sp>
+    </p:spTree>
+    <p:extLst>
+      <p:ext uri="{BB962C8B-B14F-4D97-AF65-F5344CB8AC3E}">
+        <p14:creationId xmlns:p14="http://schemas.microsoft.com/office/powerpoint/2010/main" val="1718330366"/>
+      </p:ext>
+    </p:extLst>
+  </p:cSld>
+  <p:clrMapOvr>
+    <a:masterClrMapping/>
+  </p:clrMapOvr>
+  <mc:AlternateContent xmlns:mc="http://schemas.openxmlformats.org/markup-compatibility/2006" xmlns:p14="http://schemas.microsoft.com/office/powerpoint/2010/main">
+    <mc:Choice Requires="p14">
+      <p:transition p14:dur="10" advClick="0"/>
+    </mc:Choice>
+    <mc:Fallback xmlns="">
+      <p:transition advClick="0"/>
+    </mc:Fallback>
+  </mc:AlternateContent>
+</p:sld>
+</file>
+
+<file path=ppt/slides/slide65.xml><?xml version="1.0" encoding="utf-8"?>
+<p:sld xmlns:a="http://schemas.openxmlformats.org/drawingml/2006/main" xmlns:r="http://schemas.openxmlformats.org/officeDocument/2006/relationships" xmlns:p="http://schemas.openxmlformats.org/presentationml/2006/main">
+  <p:cSld>
+    <p:spTree>
+      <p:nvGrpSpPr>
+        <p:cNvPr id="1" name=""/>
+        <p:cNvGrpSpPr/>
+        <p:nvPr/>
+      </p:nvGrpSpPr>
+      <p:grpSpPr>
+        <a:xfrm>
+          <a:off x="0" y="0"/>
+          <a:ext cx="0" cy="0"/>
+          <a:chOff x="0" y="0"/>
+          <a:chExt cx="0" cy="0"/>
+        </a:xfrm>
+      </p:grpSpPr>
+      <p:sp>
+        <p:nvSpPr>
+          <p:cNvPr id="2" name="Title 1"/>
+          <p:cNvSpPr>
+            <a:spLocks noGrp="1"/>
+          </p:cNvSpPr>
+          <p:nvPr>
+            <p:ph type="title"/>
+          </p:nvPr>
+        </p:nvSpPr>
+        <p:spPr/>
+        <p:txBody>
+          <a:bodyPr/>
+          <a:lstStyle/>
+          <a:p>
+            <a:endParaRPr lang="en-GB"/>
+          </a:p>
+        </p:txBody>
+      </p:sp>
+      <p:sp>
+        <p:nvSpPr>
+          <p:cNvPr id="3" name="Content Placeholder 2"/>
+          <p:cNvSpPr>
+            <a:spLocks noGrp="1"/>
+          </p:cNvSpPr>
+          <p:nvPr>
+            <p:ph idx="1"/>
+          </p:nvPr>
+        </p:nvSpPr>
+        <p:spPr/>
+        <p:txBody>
+          <a:bodyPr/>
+          <a:lstStyle/>
+          <a:p>
+            <a:endParaRPr lang="en-GB"/>
+          </a:p>
+        </p:txBody>
+      </p:sp>
+      <p:sp>
+        <p:nvSpPr>
+          <p:cNvPr id="4" name="Slide Number Placeholder 3"/>
+          <p:cNvSpPr>
+            <a:spLocks noGrp="1"/>
+          </p:cNvSpPr>
+          <p:nvPr>
+            <p:ph type="sldNum" sz="quarter" idx="10"/>
+          </p:nvPr>
+        </p:nvSpPr>
+        <p:spPr/>
+        <p:txBody>
+          <a:bodyPr/>
+          <a:lstStyle/>
+          <a:p>
+            <a:pPr marL="0" marR="0" lvl="0" indent="0" algn="r" rtl="0">
+              <a:spcBef>
+                <a:spcPts val="0"/>
+              </a:spcBef>
+              <a:spcAft>
+                <a:spcPts val="0"/>
+              </a:spcAft>
+              <a:buSzPct val="25000"/>
+              <a:buNone/>
+            </a:pPr>
+            <a:fld id="{00000000-1234-1234-1234-123412341234}" type="slidenum">
+              <a:rPr lang="en-GB" sz="1000" b="0" i="0" u="none" strike="noStrike" cap="none" smtClean="0">
+                <a:solidFill>
+                  <a:schemeClr val="dk1"/>
+                </a:solidFill>
+                <a:latin typeface="Calibri"/>
+                <a:ea typeface="Calibri"/>
+                <a:cs typeface="Calibri"/>
+                <a:sym typeface="Calibri"/>
+              </a:rPr>
+              <a:t>65</a:t>
             </a:fld>
             <a:endParaRPr lang="en-GB" sz="1000" b="0" i="0" u="none" strike="noStrike" cap="none">
               <a:solidFill>
@@ -40039,7 +40367,7 @@
 </p:sld>
 </file>
 
-<file path=ppt/slides/slide65.xml><?xml version="1.0" encoding="utf-8"?>
+<file path=ppt/slides/slide66.xml><?xml version="1.0" encoding="utf-8"?>
 <p:sld xmlns:a="http://schemas.openxmlformats.org/drawingml/2006/main" xmlns:r="http://schemas.openxmlformats.org/officeDocument/2006/relationships" xmlns:p="http://schemas.openxmlformats.org/presentationml/2006/main">
   <p:cSld>
     <p:spTree>
@@ -40682,7 +41010,7 @@
                 <a:cs typeface="Calibri"/>
                 <a:sym typeface="Calibri"/>
               </a:rPr>
-              <a:t>65</a:t>
+              <a:t>66</a:t>
             </a:fld>
             <a:endParaRPr lang="en-GB" sz="1000" b="0" i="0" u="none" strike="noStrike" cap="none">
               <a:solidFill>
@@ -41019,7 +41347,7 @@
 </p:sld>
 </file>
 
-<file path=ppt/slides/slide66.xml><?xml version="1.0" encoding="utf-8"?>
+<file path=ppt/slides/slide67.xml><?xml version="1.0" encoding="utf-8"?>
 <p:sld xmlns:a="http://schemas.openxmlformats.org/drawingml/2006/main" xmlns:r="http://schemas.openxmlformats.org/officeDocument/2006/relationships" xmlns:p="http://schemas.openxmlformats.org/presentationml/2006/main">
   <p:cSld>
     <p:spTree>
@@ -41500,7 +41828,7 @@
                 <a:cs typeface="Calibri"/>
                 <a:sym typeface="Calibri"/>
               </a:rPr>
-              <a:t>66</a:t>
+              <a:t>67</a:t>
             </a:fld>
             <a:endParaRPr lang="en-GB" sz="1000" b="0" i="0" u="none" strike="noStrike" cap="none">
               <a:solidFill>
@@ -41837,7 +42165,7 @@
 </p:sld>
 </file>
 
-<file path=ppt/slides/slide67.xml><?xml version="1.0" encoding="utf-8"?>
+<file path=ppt/slides/slide68.xml><?xml version="1.0" encoding="utf-8"?>
 <p:sld xmlns:a="http://schemas.openxmlformats.org/drawingml/2006/main" xmlns:r="http://schemas.openxmlformats.org/officeDocument/2006/relationships" xmlns:p="http://schemas.openxmlformats.org/presentationml/2006/main">
   <p:cSld>
     <p:spTree>
@@ -42512,7 +42840,7 @@
                 <a:cs typeface="Calibri"/>
                 <a:sym typeface="Calibri"/>
               </a:rPr>
-              <a:t>67</a:t>
+              <a:t>68</a:t>
             </a:fld>
             <a:endParaRPr lang="en-GB" sz="1000" b="0" i="0" u="none" strike="noStrike" cap="none">
               <a:solidFill>
@@ -42849,7 +43177,7 @@
 </p:sld>
 </file>
 
-<file path=ppt/slides/slide68.xml><?xml version="1.0" encoding="utf-8"?>
+<file path=ppt/slides/slide69.xml><?xml version="1.0" encoding="utf-8"?>
 <p:sld xmlns:a="http://schemas.openxmlformats.org/drawingml/2006/main" xmlns:r="http://schemas.openxmlformats.org/officeDocument/2006/relationships" xmlns:p="http://schemas.openxmlformats.org/presentationml/2006/main">
   <p:cSld>
     <p:spTree>
@@ -42939,7 +43267,7 @@
                 <a:cs typeface="Calibri"/>
                 <a:sym typeface="Calibri"/>
               </a:rPr>
-              <a:t>68</a:t>
+              <a:t>69</a:t>
             </a:fld>
             <a:endParaRPr lang="en-GB" sz="1000" b="0" i="0" u="none" strike="noStrike" cap="none">
               <a:solidFill>
@@ -42974,7 +43302,168 @@
 </p:sld>
 </file>
 
-<file path=ppt/slides/slide69.xml><?xml version="1.0" encoding="utf-8"?>
+<file path=ppt/slides/slide7.xml><?xml version="1.0" encoding="utf-8"?>
+<p:sld xmlns:a="http://schemas.openxmlformats.org/drawingml/2006/main" xmlns:r="http://schemas.openxmlformats.org/officeDocument/2006/relationships" xmlns:p="http://schemas.openxmlformats.org/presentationml/2006/main">
+  <p:cSld>
+    <p:spTree>
+      <p:nvGrpSpPr>
+        <p:cNvPr id="1" name=""/>
+        <p:cNvGrpSpPr/>
+        <p:nvPr/>
+      </p:nvGrpSpPr>
+      <p:grpSpPr>
+        <a:xfrm>
+          <a:off x="0" y="0"/>
+          <a:ext cx="0" cy="0"/>
+          <a:chOff x="0" y="0"/>
+          <a:chExt cx="0" cy="0"/>
+        </a:xfrm>
+      </p:grpSpPr>
+      <p:sp>
+        <p:nvSpPr>
+          <p:cNvPr id="2" name="Title 1"/>
+          <p:cNvSpPr>
+            <a:spLocks noGrp="1"/>
+          </p:cNvSpPr>
+          <p:nvPr>
+            <p:ph type="title"/>
+          </p:nvPr>
+        </p:nvSpPr>
+        <p:spPr/>
+        <p:txBody>
+          <a:bodyPr/>
+          <a:lstStyle/>
+          <a:p>
+            <a:r>
+              <a:rPr lang="en-GB" dirty="0" smtClean="0"/>
+              <a:t>Motivation</a:t>
+            </a:r>
+            <a:endParaRPr lang="en-GB" dirty="0"/>
+          </a:p>
+        </p:txBody>
+      </p:sp>
+      <p:sp>
+        <p:nvSpPr>
+          <p:cNvPr id="3" name="Content Placeholder 2"/>
+          <p:cNvSpPr>
+            <a:spLocks noGrp="1"/>
+          </p:cNvSpPr>
+          <p:nvPr>
+            <p:ph idx="1"/>
+          </p:nvPr>
+        </p:nvSpPr>
+        <p:spPr/>
+        <p:txBody>
+          <a:bodyPr/>
+          <a:lstStyle/>
+          <a:p>
+            <a:r>
+              <a:rPr lang="en-GB" dirty="0" err="1" smtClean="0"/>
+              <a:t>DDMoRe</a:t>
+            </a:r>
+            <a:r>
+              <a:rPr lang="en-GB" dirty="0" smtClean="0"/>
+              <a:t> standards facilitate understanding and knowledge sharing across tools:</a:t>
+            </a:r>
+          </a:p>
+          <a:p>
+            <a:pPr lvl="1"/>
+            <a:r>
+              <a:rPr lang="en-GB" dirty="0" smtClean="0"/>
+              <a:t>We all “know” what a 1 compartment Pop PK model looks like</a:t>
+            </a:r>
+          </a:p>
+          <a:p>
+            <a:pPr lvl="1"/>
+            <a:r>
+              <a:rPr lang="en-GB" dirty="0" smtClean="0"/>
+              <a:t>BUT if we ask 10 modellers to encode it across the tools listed previously, would we get </a:t>
+            </a:r>
+            <a:r>
+              <a:rPr lang="en-GB" b="1" i="1" dirty="0" smtClean="0"/>
+              <a:t>the same or a consistent</a:t>
+            </a:r>
+            <a:r>
+              <a:rPr lang="en-GB" dirty="0" smtClean="0"/>
+              <a:t> model across these?</a:t>
+            </a:r>
+          </a:p>
+          <a:p>
+            <a:endParaRPr lang="en-GB" dirty="0"/>
+          </a:p>
+        </p:txBody>
+      </p:sp>
+      <p:sp>
+        <p:nvSpPr>
+          <p:cNvPr id="4" name="Slide Number Placeholder 3"/>
+          <p:cNvSpPr>
+            <a:spLocks noGrp="1"/>
+          </p:cNvSpPr>
+          <p:nvPr>
+            <p:ph type="sldNum" sz="quarter" idx="10"/>
+          </p:nvPr>
+        </p:nvSpPr>
+        <p:spPr/>
+        <p:txBody>
+          <a:bodyPr/>
+          <a:lstStyle/>
+          <a:p>
+            <a:pPr marL="0" marR="0" lvl="0" indent="0" algn="r" rtl="0">
+              <a:spcBef>
+                <a:spcPts val="0"/>
+              </a:spcBef>
+              <a:spcAft>
+                <a:spcPts val="0"/>
+              </a:spcAft>
+              <a:buSzPct val="25000"/>
+              <a:buNone/>
+            </a:pPr>
+            <a:fld id="{00000000-1234-1234-1234-123412341234}" type="slidenum">
+              <a:rPr lang="en-GB" sz="1000" b="0" i="0" u="none" strike="noStrike" cap="none" smtClean="0">
+                <a:solidFill>
+                  <a:schemeClr val="dk1"/>
+                </a:solidFill>
+                <a:latin typeface="Calibri"/>
+                <a:ea typeface="Calibri"/>
+                <a:cs typeface="Calibri"/>
+                <a:sym typeface="Calibri"/>
+              </a:rPr>
+              <a:t>7</a:t>
+            </a:fld>
+            <a:endParaRPr lang="en-GB" sz="1000" b="0" i="0" u="none" strike="noStrike" cap="none">
+              <a:solidFill>
+                <a:schemeClr val="dk1"/>
+              </a:solidFill>
+              <a:latin typeface="Calibri"/>
+              <a:ea typeface="Calibri"/>
+              <a:cs typeface="Calibri"/>
+              <a:sym typeface="Calibri"/>
+            </a:endParaRPr>
+          </a:p>
+        </p:txBody>
+      </p:sp>
+    </p:spTree>
+    <p:extLst>
+      <p:ext uri="{BB962C8B-B14F-4D97-AF65-F5344CB8AC3E}">
+        <p14:creationId xmlns:p14="http://schemas.microsoft.com/office/powerpoint/2010/main" val="1236790871"/>
+      </p:ext>
+    </p:extLst>
+  </p:cSld>
+  <p:clrMapOvr>
+    <a:masterClrMapping/>
+  </p:clrMapOvr>
+  <mc:AlternateContent xmlns:mc="http://schemas.openxmlformats.org/markup-compatibility/2006" xmlns:p14="http://schemas.microsoft.com/office/powerpoint/2010/main">
+    <mc:Choice Requires="p14">
+      <p:transition p14:dur="0" advClick="0"/>
+    </mc:Choice>
+    <mc:Fallback xmlns="">
+      <p:transition advClick="0"/>
+    </mc:Fallback>
+  </mc:AlternateContent>
+</p:sld>
+</file>
+
+<file path=ppt/slides/slide70.xml><?xml version="1.0" encoding="utf-8"?>
 <p:sld xmlns:a="http://schemas.openxmlformats.org/drawingml/2006/main" xmlns:r="http://schemas.openxmlformats.org/officeDocument/2006/relationships" xmlns:p="http://schemas.openxmlformats.org/presentationml/2006/main">
   <p:cSld>
     <p:spTree>
@@ -43369,7 +43858,7 @@
                 <a:cs typeface="Calibri"/>
                 <a:sym typeface="Calibri"/>
               </a:rPr>
-              <a:t>69</a:t>
+              <a:t>70</a:t>
             </a:fld>
             <a:endParaRPr lang="en-GB" sz="1000" b="0" i="0" u="none" strike="noStrike" cap="none">
               <a:solidFill>
@@ -43406,168 +43895,7 @@
 </p:sld>
 </file>
 
-<file path=ppt/slides/slide7.xml><?xml version="1.0" encoding="utf-8"?>
-<p:sld xmlns:a="http://schemas.openxmlformats.org/drawingml/2006/main" xmlns:r="http://schemas.openxmlformats.org/officeDocument/2006/relationships" xmlns:p="http://schemas.openxmlformats.org/presentationml/2006/main">
-  <p:cSld>
-    <p:spTree>
-      <p:nvGrpSpPr>
-        <p:cNvPr id="1" name=""/>
-        <p:cNvGrpSpPr/>
-        <p:nvPr/>
-      </p:nvGrpSpPr>
-      <p:grpSpPr>
-        <a:xfrm>
-          <a:off x="0" y="0"/>
-          <a:ext cx="0" cy="0"/>
-          <a:chOff x="0" y="0"/>
-          <a:chExt cx="0" cy="0"/>
-        </a:xfrm>
-      </p:grpSpPr>
-      <p:sp>
-        <p:nvSpPr>
-          <p:cNvPr id="2" name="Title 1"/>
-          <p:cNvSpPr>
-            <a:spLocks noGrp="1"/>
-          </p:cNvSpPr>
-          <p:nvPr>
-            <p:ph type="title"/>
-          </p:nvPr>
-        </p:nvSpPr>
-        <p:spPr/>
-        <p:txBody>
-          <a:bodyPr/>
-          <a:lstStyle/>
-          <a:p>
-            <a:r>
-              <a:rPr lang="en-GB" dirty="0" smtClean="0"/>
-              <a:t>Motivation</a:t>
-            </a:r>
-            <a:endParaRPr lang="en-GB" dirty="0"/>
-          </a:p>
-        </p:txBody>
-      </p:sp>
-      <p:sp>
-        <p:nvSpPr>
-          <p:cNvPr id="3" name="Content Placeholder 2"/>
-          <p:cNvSpPr>
-            <a:spLocks noGrp="1"/>
-          </p:cNvSpPr>
-          <p:nvPr>
-            <p:ph idx="1"/>
-          </p:nvPr>
-        </p:nvSpPr>
-        <p:spPr/>
-        <p:txBody>
-          <a:bodyPr/>
-          <a:lstStyle/>
-          <a:p>
-            <a:r>
-              <a:rPr lang="en-GB" dirty="0" err="1" smtClean="0"/>
-              <a:t>DDMoRe</a:t>
-            </a:r>
-            <a:r>
-              <a:rPr lang="en-GB" dirty="0" smtClean="0"/>
-              <a:t> standards facilitate understanding and knowledge sharing across tools:</a:t>
-            </a:r>
-          </a:p>
-          <a:p>
-            <a:pPr lvl="1"/>
-            <a:r>
-              <a:rPr lang="en-GB" dirty="0" smtClean="0"/>
-              <a:t>We all “know” what a 1 compartment Pop PK model looks like</a:t>
-            </a:r>
-          </a:p>
-          <a:p>
-            <a:pPr lvl="1"/>
-            <a:r>
-              <a:rPr lang="en-GB" dirty="0" smtClean="0"/>
-              <a:t>BUT if we ask 10 modellers to encode it across the tools listed previously, would we get </a:t>
-            </a:r>
-            <a:r>
-              <a:rPr lang="en-GB" b="1" i="1" dirty="0" smtClean="0"/>
-              <a:t>the same or a consistent</a:t>
-            </a:r>
-            <a:r>
-              <a:rPr lang="en-GB" dirty="0" smtClean="0"/>
-              <a:t> model across these?</a:t>
-            </a:r>
-          </a:p>
-          <a:p>
-            <a:endParaRPr lang="en-GB" dirty="0"/>
-          </a:p>
-        </p:txBody>
-      </p:sp>
-      <p:sp>
-        <p:nvSpPr>
-          <p:cNvPr id="4" name="Slide Number Placeholder 3"/>
-          <p:cNvSpPr>
-            <a:spLocks noGrp="1"/>
-          </p:cNvSpPr>
-          <p:nvPr>
-            <p:ph type="sldNum" sz="quarter" idx="10"/>
-          </p:nvPr>
-        </p:nvSpPr>
-        <p:spPr/>
-        <p:txBody>
-          <a:bodyPr/>
-          <a:lstStyle/>
-          <a:p>
-            <a:pPr marL="0" marR="0" lvl="0" indent="0" algn="r" rtl="0">
-              <a:spcBef>
-                <a:spcPts val="0"/>
-              </a:spcBef>
-              <a:spcAft>
-                <a:spcPts val="0"/>
-              </a:spcAft>
-              <a:buSzPct val="25000"/>
-              <a:buNone/>
-            </a:pPr>
-            <a:fld id="{00000000-1234-1234-1234-123412341234}" type="slidenum">
-              <a:rPr lang="en-GB" sz="1000" b="0" i="0" u="none" strike="noStrike" cap="none" smtClean="0">
-                <a:solidFill>
-                  <a:schemeClr val="dk1"/>
-                </a:solidFill>
-                <a:latin typeface="Calibri"/>
-                <a:ea typeface="Calibri"/>
-                <a:cs typeface="Calibri"/>
-                <a:sym typeface="Calibri"/>
-              </a:rPr>
-              <a:t>7</a:t>
-            </a:fld>
-            <a:endParaRPr lang="en-GB" sz="1000" b="0" i="0" u="none" strike="noStrike" cap="none">
-              <a:solidFill>
-                <a:schemeClr val="dk1"/>
-              </a:solidFill>
-              <a:latin typeface="Calibri"/>
-              <a:ea typeface="Calibri"/>
-              <a:cs typeface="Calibri"/>
-              <a:sym typeface="Calibri"/>
-            </a:endParaRPr>
-          </a:p>
-        </p:txBody>
-      </p:sp>
-    </p:spTree>
-    <p:extLst>
-      <p:ext uri="{BB962C8B-B14F-4D97-AF65-F5344CB8AC3E}">
-        <p14:creationId xmlns:p14="http://schemas.microsoft.com/office/powerpoint/2010/main" val="1236790871"/>
-      </p:ext>
-    </p:extLst>
-  </p:cSld>
-  <p:clrMapOvr>
-    <a:masterClrMapping/>
-  </p:clrMapOvr>
-  <mc:AlternateContent xmlns:mc="http://schemas.openxmlformats.org/markup-compatibility/2006" xmlns:p14="http://schemas.microsoft.com/office/powerpoint/2010/main">
-    <mc:Choice Requires="p14">
-      <p:transition p14:dur="0" advClick="0"/>
-    </mc:Choice>
-    <mc:Fallback xmlns="">
-      <p:transition advClick="0"/>
-    </mc:Fallback>
-  </mc:AlternateContent>
-</p:sld>
-</file>
-
-<file path=ppt/slides/slide70.xml><?xml version="1.0" encoding="utf-8"?>
+<file path=ppt/slides/slide71.xml><?xml version="1.0" encoding="utf-8"?>
 <p:sld xmlns:a="http://schemas.openxmlformats.org/drawingml/2006/main" xmlns:r="http://schemas.openxmlformats.org/officeDocument/2006/relationships" xmlns:p="http://schemas.openxmlformats.org/presentationml/2006/main">
   <p:cSld>
     <p:spTree>
@@ -43901,7 +44229,7 @@
                 <a:cs typeface="Calibri"/>
                 <a:sym typeface="Calibri"/>
               </a:rPr>
-              <a:t>70</a:t>
+              <a:t>71</a:t>
             </a:fld>
             <a:endParaRPr lang="en-GB" sz="1000" b="0" i="0" u="none" strike="noStrike" cap="none">
               <a:solidFill>
@@ -43926,198 +44254,6 @@
     </mc:Choice>
     <mc:Fallback xmlns="">
       <p:transition/>
-    </mc:Fallback>
-  </mc:AlternateContent>
-  <p:timing>
-    <p:tnLst>
-      <p:par>
-        <p:cTn id="1" dur="indefinite" restart="never" nodeType="tmRoot"/>
-      </p:par>
-    </p:tnLst>
-  </p:timing>
-</p:sld>
-</file>
-
-<file path=ppt/slides/slide71.xml><?xml version="1.0" encoding="utf-8"?>
-<p:sld xmlns:a="http://schemas.openxmlformats.org/drawingml/2006/main" xmlns:r="http://schemas.openxmlformats.org/officeDocument/2006/relationships" xmlns:p="http://schemas.openxmlformats.org/presentationml/2006/main">
-  <p:cSld>
-    <p:spTree>
-      <p:nvGrpSpPr>
-        <p:cNvPr id="1" name=""/>
-        <p:cNvGrpSpPr/>
-        <p:nvPr/>
-      </p:nvGrpSpPr>
-      <p:grpSpPr>
-        <a:xfrm>
-          <a:off x="0" y="0"/>
-          <a:ext cx="0" cy="0"/>
-          <a:chOff x="0" y="0"/>
-          <a:chExt cx="0" cy="0"/>
-        </a:xfrm>
-      </p:grpSpPr>
-      <p:sp>
-        <p:nvSpPr>
-          <p:cNvPr id="2" name="Title 1"/>
-          <p:cNvSpPr>
-            <a:spLocks noGrp="1"/>
-          </p:cNvSpPr>
-          <p:nvPr>
-            <p:ph type="title"/>
-          </p:nvPr>
-        </p:nvSpPr>
-        <p:spPr/>
-        <p:txBody>
-          <a:bodyPr/>
-          <a:lstStyle/>
-          <a:p>
-            <a:r>
-              <a:rPr lang="en-GB" dirty="0" smtClean="0"/>
-              <a:t>MDL Structure hierarchy</a:t>
-            </a:r>
-            <a:endParaRPr lang="en-GB" dirty="0"/>
-          </a:p>
-        </p:txBody>
-      </p:sp>
-      <p:sp>
-        <p:nvSpPr>
-          <p:cNvPr id="3" name="Content Placeholder 2"/>
-          <p:cNvSpPr>
-            <a:spLocks noGrp="1"/>
-          </p:cNvSpPr>
-          <p:nvPr>
-            <p:ph idx="1"/>
-          </p:nvPr>
-        </p:nvSpPr>
-        <p:spPr/>
-        <p:txBody>
-          <a:bodyPr/>
-          <a:lstStyle/>
-          <a:p>
-            <a:r>
-              <a:rPr lang="en-GB" dirty="0"/>
-              <a:t>Object definitions describe which Blocks are valid within each Object.</a:t>
-            </a:r>
-          </a:p>
-          <a:p>
-            <a:endParaRPr lang="en-GB" dirty="0" smtClean="0"/>
-          </a:p>
-          <a:p>
-            <a:r>
-              <a:rPr lang="en-GB" dirty="0" smtClean="0"/>
-              <a:t>Block </a:t>
-            </a:r>
-            <a:r>
-              <a:rPr lang="en-GB" dirty="0"/>
-              <a:t>definitions describe</a:t>
-            </a:r>
-          </a:p>
-          <a:p>
-            <a:pPr lvl="1"/>
-            <a:r>
-              <a:rPr lang="en-GB" dirty="0"/>
-              <a:t>what arguments are associated with the block</a:t>
-            </a:r>
-          </a:p>
-          <a:p>
-            <a:pPr lvl="1"/>
-            <a:r>
-              <a:rPr lang="en-GB" dirty="0"/>
-              <a:t>what types of statements can be made within the block</a:t>
-            </a:r>
-          </a:p>
-          <a:p>
-            <a:pPr lvl="1"/>
-            <a:r>
-              <a:rPr lang="en-GB" dirty="0"/>
-              <a:t>what sub-blocks are permitted within the block</a:t>
-            </a:r>
-          </a:p>
-          <a:p>
-            <a:pPr lvl="1"/>
-            <a:r>
-              <a:rPr lang="en-GB" dirty="0"/>
-              <a:t>what list types are to be used with the block</a:t>
-            </a:r>
-          </a:p>
-          <a:p>
-            <a:pPr lvl="1"/>
-            <a:r>
-              <a:rPr lang="en-GB" dirty="0"/>
-              <a:t>what properties are permitted within the block</a:t>
-            </a:r>
-            <a:r>
-              <a:rPr lang="en-GB" dirty="0" smtClean="0"/>
-              <a:t>.</a:t>
-            </a:r>
-            <a:endParaRPr lang="en-GB" dirty="0"/>
-          </a:p>
-        </p:txBody>
-      </p:sp>
-      <p:sp>
-        <p:nvSpPr>
-          <p:cNvPr id="4" name="Slide Number Placeholder 3"/>
-          <p:cNvSpPr>
-            <a:spLocks noGrp="1"/>
-          </p:cNvSpPr>
-          <p:nvPr>
-            <p:ph type="sldNum" sz="quarter" idx="10"/>
-          </p:nvPr>
-        </p:nvSpPr>
-        <p:spPr/>
-        <p:txBody>
-          <a:bodyPr/>
-          <a:lstStyle/>
-          <a:p>
-            <a:pPr marL="0" marR="0" lvl="0" indent="0" algn="r" rtl="0">
-              <a:spcBef>
-                <a:spcPts val="0"/>
-              </a:spcBef>
-              <a:spcAft>
-                <a:spcPts val="0"/>
-              </a:spcAft>
-              <a:buSzPct val="25000"/>
-              <a:buNone/>
-            </a:pPr>
-            <a:fld id="{00000000-1234-1234-1234-123412341234}" type="slidenum">
-              <a:rPr lang="en-GB" sz="1000" b="0" i="0" u="none" strike="noStrike" cap="none" smtClean="0">
-                <a:solidFill>
-                  <a:schemeClr val="dk1"/>
-                </a:solidFill>
-                <a:latin typeface="Calibri"/>
-                <a:ea typeface="Calibri"/>
-                <a:cs typeface="Calibri"/>
-                <a:sym typeface="Calibri"/>
-              </a:rPr>
-              <a:t>71</a:t>
-            </a:fld>
-            <a:endParaRPr lang="en-GB" sz="1000" b="0" i="0" u="none" strike="noStrike" cap="none">
-              <a:solidFill>
-                <a:schemeClr val="dk1"/>
-              </a:solidFill>
-              <a:latin typeface="Calibri"/>
-              <a:ea typeface="Calibri"/>
-              <a:cs typeface="Calibri"/>
-              <a:sym typeface="Calibri"/>
-            </a:endParaRPr>
-          </a:p>
-        </p:txBody>
-      </p:sp>
-    </p:spTree>
-    <p:extLst>
-      <p:ext uri="{BB962C8B-B14F-4D97-AF65-F5344CB8AC3E}">
-        <p14:creationId xmlns:p14="http://schemas.microsoft.com/office/powerpoint/2010/main" val="2698046943"/>
-      </p:ext>
-    </p:extLst>
-  </p:cSld>
-  <p:clrMapOvr>
-    <a:masterClrMapping/>
-  </p:clrMapOvr>
-  <mc:AlternateContent xmlns:mc="http://schemas.openxmlformats.org/markup-compatibility/2006" xmlns:p14="http://schemas.microsoft.com/office/powerpoint/2010/main">
-    <mc:Choice Requires="p14">
-      <p:transition p14:dur="10" advClick="0"/>
-    </mc:Choice>
-    <mc:Fallback xmlns="">
-      <p:transition advClick="0"/>
     </mc:Fallback>
   </mc:AlternateContent>
   <p:timing>
@@ -44162,7 +44298,11 @@
           <a:bodyPr/>
           <a:lstStyle/>
           <a:p>
-            <a:endParaRPr lang="en-GB"/>
+            <a:r>
+              <a:rPr lang="en-GB" dirty="0" smtClean="0"/>
+              <a:t>MDL Structure hierarchy</a:t>
+            </a:r>
+            <a:endParaRPr lang="en-GB" dirty="0"/>
           </a:p>
         </p:txBody>
       </p:sp>
@@ -44183,71 +44323,60 @@
           <a:p>
             <a:r>
               <a:rPr lang="en-GB" dirty="0"/>
-              <a:t>List types define</a:t>
+              <a:t>Object definitions describe which Blocks are valid within each Object.</a:t>
+            </a:r>
+          </a:p>
+          <a:p>
+            <a:endParaRPr lang="en-GB" dirty="0" smtClean="0"/>
+          </a:p>
+          <a:p>
+            <a:r>
+              <a:rPr lang="en-GB" dirty="0" smtClean="0"/>
+              <a:t>Block </a:t>
+            </a:r>
+            <a:r>
+              <a:rPr lang="en-GB" dirty="0"/>
+              <a:t>definitions describe</a:t>
             </a:r>
           </a:p>
           <a:p>
             <a:pPr lvl="1"/>
             <a:r>
               <a:rPr lang="en-GB" dirty="0"/>
-              <a:t>whether the list can be anonymous i.e. using ::{ type is … }</a:t>
+              <a:t>what arguments are associated with the block</a:t>
             </a:r>
           </a:p>
           <a:p>
             <a:pPr lvl="1"/>
             <a:r>
               <a:rPr lang="en-GB" dirty="0"/>
-              <a:t>whether the list can define categories</a:t>
+              <a:t>what types of statements can be made within the block</a:t>
             </a:r>
           </a:p>
           <a:p>
             <a:pPr lvl="1"/>
             <a:r>
               <a:rPr lang="en-GB" dirty="0"/>
-              <a:t>what types are associated with the list i.e. type is …</a:t>
+              <a:t>what sub-blocks are permitted within the block</a:t>
             </a:r>
           </a:p>
           <a:p>
             <a:pPr lvl="1"/>
             <a:r>
               <a:rPr lang="en-GB" dirty="0"/>
-              <a:t>what attributes are permitted </a:t>
-            </a:r>
-            <a:r>
-              <a:rPr lang="en-GB" dirty="0" err="1"/>
-              <a:t>withing</a:t>
-            </a:r>
+              <a:t>what list types are to be used with the block</a:t>
+            </a:r>
+          </a:p>
+          <a:p>
+            <a:pPr lvl="1"/>
             <a:r>
               <a:rPr lang="en-GB" dirty="0"/>
-              <a:t> the list.</a:t>
-            </a:r>
-          </a:p>
-          <a:p>
-            <a:pPr lvl="1"/>
-            <a:r>
-              <a:rPr lang="en-GB" dirty="0"/>
-              <a:t>what the “signature” of the list looks like, including identifying which attributes are optional.</a:t>
-            </a:r>
-          </a:p>
-          <a:p>
-            <a:pPr lvl="1"/>
-            <a:r>
-              <a:rPr lang="en-GB" dirty="0"/>
-              <a:t>NB: list type names do not necessarily match the names used in MDL e.g. in defining individual parameters we type CL : {type is linear, … } but the type of the list in the Reference Guide is “</a:t>
-            </a:r>
-            <a:r>
-              <a:rPr lang="en-GB" dirty="0" err="1"/>
-              <a:t>IndivParamLinear</a:t>
-            </a:r>
-            <a:r>
-              <a:rPr lang="en-GB" dirty="0"/>
-              <a:t>”. However the list type is given in the Block definition List table (left hand column) with the associated MDL key value in the right hand column.</a:t>
-            </a:r>
-          </a:p>
-          <a:p>
-            <a:endParaRPr lang="en-GB" dirty="0"/>
-          </a:p>
-          <a:p>
+              <a:t>what properties are permitted within the block</a:t>
+            </a:r>
+            <a:r>
+              <a:rPr lang="en-GB" dirty="0" smtClean="0"/>
+              <a:t>.</a:t>
+            </a:r>
             <a:endParaRPr lang="en-GB" dirty="0"/>
           </a:p>
         </p:txBody>
@@ -44304,7 +44433,7 @@
     </p:spTree>
     <p:extLst>
       <p:ext uri="{BB962C8B-B14F-4D97-AF65-F5344CB8AC3E}">
-        <p14:creationId xmlns:p14="http://schemas.microsoft.com/office/powerpoint/2010/main" val="2579562207"/>
+        <p14:creationId xmlns:p14="http://schemas.microsoft.com/office/powerpoint/2010/main" val="2698046943"/>
       </p:ext>
     </p:extLst>
   </p:cSld>
@@ -44361,7 +44490,7 @@
           <a:bodyPr/>
           <a:lstStyle/>
           <a:p>
-            <a:endParaRPr lang="en-GB" dirty="0"/>
+            <a:endParaRPr lang="en-GB"/>
           </a:p>
         </p:txBody>
       </p:sp>
@@ -44381,12 +44510,58 @@
           <a:lstStyle/>
           <a:p>
             <a:r>
+              <a:rPr lang="en-GB" dirty="0"/>
+              <a:t>List types define</a:t>
+            </a:r>
+          </a:p>
+          <a:p>
+            <a:pPr lvl="1"/>
+            <a:r>
+              <a:rPr lang="en-GB" dirty="0"/>
+              <a:t>whether the list can be anonymous i.e. using ::{ type is … }</a:t>
+            </a:r>
+          </a:p>
+          <a:p>
+            <a:pPr lvl="1"/>
+            <a:r>
+              <a:rPr lang="en-GB" dirty="0"/>
+              <a:t>whether the list can define categories</a:t>
+            </a:r>
+          </a:p>
+          <a:p>
+            <a:pPr lvl="1"/>
+            <a:r>
+              <a:rPr lang="en-GB" dirty="0"/>
+              <a:t>what types are associated with the list i.e. type is …</a:t>
+            </a:r>
+          </a:p>
+          <a:p>
+            <a:pPr lvl="1"/>
+            <a:r>
+              <a:rPr lang="en-GB" dirty="0"/>
+              <a:t>what attributes are permitted </a:t>
+            </a:r>
+            <a:r>
               <a:rPr lang="en-GB" dirty="0" err="1"/>
-              <a:t>Sublist</a:t>
+              <a:t>withing</a:t>
             </a:r>
             <a:r>
               <a:rPr lang="en-GB" dirty="0"/>
-              <a:t> definitions define the (small number of) cases where list types contain other lists, for example in definition of the fixed effect model within a </a:t>
+              <a:t> the list.</a:t>
+            </a:r>
+          </a:p>
+          <a:p>
+            <a:pPr lvl="1"/>
+            <a:r>
+              <a:rPr lang="en-GB" dirty="0"/>
+              <a:t>what the “signature” of the list looks like, including identifying which attributes are optional.</a:t>
+            </a:r>
+          </a:p>
+          <a:p>
+            <a:pPr lvl="1"/>
+            <a:r>
+              <a:rPr lang="en-GB" dirty="0"/>
+              <a:t>NB: list type names do not necessarily match the names used in MDL e.g. in defining individual parameters we type CL : {type is linear, … } but the type of the list in the Reference Guide is “</a:t>
             </a:r>
             <a:r>
               <a:rPr lang="en-GB" dirty="0" err="1"/>
@@ -44394,74 +44569,13 @@
             </a:r>
             <a:r>
               <a:rPr lang="en-GB" dirty="0"/>
-              <a:t> list. The </a:t>
-            </a:r>
-            <a:r>
-              <a:rPr lang="en-GB" dirty="0" err="1"/>
-              <a:t>sublist</a:t>
-            </a:r>
-            <a:r>
-              <a:rPr lang="en-GB" dirty="0"/>
-              <a:t> definition defines:</a:t>
-            </a:r>
-          </a:p>
-          <a:p>
-            <a:pPr lvl="1"/>
-            <a:r>
-              <a:rPr lang="en-GB" dirty="0"/>
-              <a:t>what attributes are permitted within the </a:t>
-            </a:r>
-            <a:r>
-              <a:rPr lang="en-GB" dirty="0" err="1"/>
-              <a:t>sublist</a:t>
-            </a:r>
+              <a:t>”. However the list type is given in the Block definition List table (left hand column) with the associated MDL key value in the right hand column.</a:t>
+            </a:r>
+          </a:p>
+          <a:p>
             <a:endParaRPr lang="en-GB" dirty="0"/>
           </a:p>
           <a:p>
-            <a:pPr lvl="1"/>
-            <a:r>
-              <a:rPr lang="en-GB" dirty="0"/>
-              <a:t>the permitted signature of the </a:t>
-            </a:r>
-            <a:r>
-              <a:rPr lang="en-GB" dirty="0" err="1"/>
-              <a:t>sublist</a:t>
-            </a:r>
-            <a:r>
-              <a:rPr lang="en-GB" dirty="0"/>
-              <a:t> and which attributes are optional.</a:t>
-            </a:r>
-          </a:p>
-          <a:p>
-            <a:endParaRPr lang="en-GB" dirty="0" smtClean="0"/>
-          </a:p>
-          <a:p>
-            <a:r>
-              <a:rPr lang="en-GB" dirty="0" smtClean="0"/>
-              <a:t>Function </a:t>
-            </a:r>
-            <a:r>
-              <a:rPr lang="en-GB" dirty="0"/>
-              <a:t>definitions define:</a:t>
-            </a:r>
-          </a:p>
-          <a:p>
-            <a:pPr lvl="1"/>
-            <a:r>
-              <a:rPr lang="en-GB" dirty="0"/>
-              <a:t>Arguments of the function</a:t>
-            </a:r>
-          </a:p>
-          <a:p>
-            <a:pPr lvl="1"/>
-            <a:r>
-              <a:rPr lang="en-GB" dirty="0"/>
-              <a:t>Type returned from the function</a:t>
-            </a:r>
-            <a:r>
-              <a:rPr lang="en-GB" dirty="0" smtClean="0"/>
-              <a:t>.</a:t>
-            </a:r>
             <a:endParaRPr lang="en-GB" dirty="0"/>
           </a:p>
         </p:txBody>
@@ -44518,7 +44632,7 @@
     </p:spTree>
     <p:extLst>
       <p:ext uri="{BB962C8B-B14F-4D97-AF65-F5344CB8AC3E}">
-        <p14:creationId xmlns:p14="http://schemas.microsoft.com/office/powerpoint/2010/main" val="647828139"/>
+        <p14:creationId xmlns:p14="http://schemas.microsoft.com/office/powerpoint/2010/main" val="2579562207"/>
       </p:ext>
     </p:extLst>
   </p:cSld>
@@ -44575,7 +44689,7 @@
           <a:bodyPr/>
           <a:lstStyle/>
           <a:p>
-            <a:endParaRPr lang="en-GB"/>
+            <a:endParaRPr lang="en-GB" dirty="0"/>
           </a:p>
         </p:txBody>
       </p:sp>
@@ -44595,34 +44709,82 @@
           <a:lstStyle/>
           <a:p>
             <a:r>
+              <a:rPr lang="en-GB" dirty="0" err="1"/>
+              <a:t>Sublist</a:t>
+            </a:r>
+            <a:r>
               <a:rPr lang="en-GB" dirty="0"/>
-              <a:t>Type definitions define</a:t>
+              <a:t> definitions define the (small number of) cases where list types contain other lists, for example in definition of the fixed effect model within a </a:t>
+            </a:r>
+            <a:r>
+              <a:rPr lang="en-GB" dirty="0" err="1"/>
+              <a:t>IndivParamLinear</a:t>
+            </a:r>
+            <a:r>
+              <a:rPr lang="en-GB" dirty="0"/>
+              <a:t> list. The </a:t>
+            </a:r>
+            <a:r>
+              <a:rPr lang="en-GB" dirty="0" err="1"/>
+              <a:t>sublist</a:t>
+            </a:r>
+            <a:r>
+              <a:rPr lang="en-GB" dirty="0"/>
+              <a:t> definition defines:</a:t>
             </a:r>
           </a:p>
           <a:p>
             <a:pPr lvl="1"/>
             <a:r>
               <a:rPr lang="en-GB" dirty="0"/>
-              <a:t>the types and associated type classes.</a:t>
-            </a:r>
+              <a:t>what attributes are permitted within the </a:t>
+            </a:r>
+            <a:r>
+              <a:rPr lang="en-GB" dirty="0" err="1"/>
+              <a:t>sublist</a:t>
+            </a:r>
+            <a:endParaRPr lang="en-GB" dirty="0"/>
           </a:p>
           <a:p>
             <a:pPr lvl="1"/>
             <a:r>
               <a:rPr lang="en-GB" dirty="0"/>
-              <a:t>the keyword types and associated enumeration types. e.g. type is combinedError1; set </a:t>
+              <a:t>the permitted signature of the </a:t>
             </a:r>
             <a:r>
               <a:rPr lang="en-GB" dirty="0" err="1"/>
-              <a:t>algo</a:t>
+              <a:t>sublist</a:t>
             </a:r>
             <a:r>
               <a:rPr lang="en-GB" dirty="0"/>
-              <a:t> is </a:t>
-            </a:r>
-            <a:r>
-              <a:rPr lang="en-GB" dirty="0" err="1"/>
-              <a:t>saem</a:t>
+              <a:t> and which attributes are optional.</a:t>
+            </a:r>
+          </a:p>
+          <a:p>
+            <a:endParaRPr lang="en-GB" dirty="0" smtClean="0"/>
+          </a:p>
+          <a:p>
+            <a:r>
+              <a:rPr lang="en-GB" dirty="0" smtClean="0"/>
+              <a:t>Function </a:t>
+            </a:r>
+            <a:r>
+              <a:rPr lang="en-GB" dirty="0"/>
+              <a:t>definitions define:</a:t>
+            </a:r>
+          </a:p>
+          <a:p>
+            <a:pPr lvl="1"/>
+            <a:r>
+              <a:rPr lang="en-GB" dirty="0"/>
+              <a:t>Arguments of the function</a:t>
+            </a:r>
+          </a:p>
+          <a:p>
+            <a:pPr lvl="1"/>
+            <a:r>
+              <a:rPr lang="en-GB" dirty="0"/>
+              <a:t>Type returned from the function</a:t>
             </a:r>
             <a:r>
               <a:rPr lang="en-GB" dirty="0" smtClean="0"/>
@@ -44668,6 +44830,172 @@
                 <a:sym typeface="Calibri"/>
               </a:rPr>
               <a:t>74</a:t>
+            </a:fld>
+            <a:endParaRPr lang="en-GB" sz="1000" b="0" i="0" u="none" strike="noStrike" cap="none">
+              <a:solidFill>
+                <a:schemeClr val="dk1"/>
+              </a:solidFill>
+              <a:latin typeface="Calibri"/>
+              <a:ea typeface="Calibri"/>
+              <a:cs typeface="Calibri"/>
+              <a:sym typeface="Calibri"/>
+            </a:endParaRPr>
+          </a:p>
+        </p:txBody>
+      </p:sp>
+    </p:spTree>
+    <p:extLst>
+      <p:ext uri="{BB962C8B-B14F-4D97-AF65-F5344CB8AC3E}">
+        <p14:creationId xmlns:p14="http://schemas.microsoft.com/office/powerpoint/2010/main" val="647828139"/>
+      </p:ext>
+    </p:extLst>
+  </p:cSld>
+  <p:clrMapOvr>
+    <a:masterClrMapping/>
+  </p:clrMapOvr>
+  <mc:AlternateContent xmlns:mc="http://schemas.openxmlformats.org/markup-compatibility/2006" xmlns:p14="http://schemas.microsoft.com/office/powerpoint/2010/main">
+    <mc:Choice Requires="p14">
+      <p:transition p14:dur="10" advClick="0"/>
+    </mc:Choice>
+    <mc:Fallback xmlns="">
+      <p:transition advClick="0"/>
+    </mc:Fallback>
+  </mc:AlternateContent>
+  <p:timing>
+    <p:tnLst>
+      <p:par>
+        <p:cTn id="1" dur="indefinite" restart="never" nodeType="tmRoot"/>
+      </p:par>
+    </p:tnLst>
+  </p:timing>
+</p:sld>
+</file>
+
+<file path=ppt/slides/slide75.xml><?xml version="1.0" encoding="utf-8"?>
+<p:sld xmlns:a="http://schemas.openxmlformats.org/drawingml/2006/main" xmlns:r="http://schemas.openxmlformats.org/officeDocument/2006/relationships" xmlns:p="http://schemas.openxmlformats.org/presentationml/2006/main">
+  <p:cSld>
+    <p:spTree>
+      <p:nvGrpSpPr>
+        <p:cNvPr id="1" name=""/>
+        <p:cNvGrpSpPr/>
+        <p:nvPr/>
+      </p:nvGrpSpPr>
+      <p:grpSpPr>
+        <a:xfrm>
+          <a:off x="0" y="0"/>
+          <a:ext cx="0" cy="0"/>
+          <a:chOff x="0" y="0"/>
+          <a:chExt cx="0" cy="0"/>
+        </a:xfrm>
+      </p:grpSpPr>
+      <p:sp>
+        <p:nvSpPr>
+          <p:cNvPr id="2" name="Title 1"/>
+          <p:cNvSpPr>
+            <a:spLocks noGrp="1"/>
+          </p:cNvSpPr>
+          <p:nvPr>
+            <p:ph type="title"/>
+          </p:nvPr>
+        </p:nvSpPr>
+        <p:spPr/>
+        <p:txBody>
+          <a:bodyPr/>
+          <a:lstStyle/>
+          <a:p>
+            <a:endParaRPr lang="en-GB"/>
+          </a:p>
+        </p:txBody>
+      </p:sp>
+      <p:sp>
+        <p:nvSpPr>
+          <p:cNvPr id="3" name="Content Placeholder 2"/>
+          <p:cNvSpPr>
+            <a:spLocks noGrp="1"/>
+          </p:cNvSpPr>
+          <p:nvPr>
+            <p:ph idx="1"/>
+          </p:nvPr>
+        </p:nvSpPr>
+        <p:spPr/>
+        <p:txBody>
+          <a:bodyPr/>
+          <a:lstStyle/>
+          <a:p>
+            <a:r>
+              <a:rPr lang="en-GB" dirty="0"/>
+              <a:t>Type definitions define</a:t>
+            </a:r>
+          </a:p>
+          <a:p>
+            <a:pPr lvl="1"/>
+            <a:r>
+              <a:rPr lang="en-GB" dirty="0"/>
+              <a:t>the types and associated type classes.</a:t>
+            </a:r>
+          </a:p>
+          <a:p>
+            <a:pPr lvl="1"/>
+            <a:r>
+              <a:rPr lang="en-GB" dirty="0"/>
+              <a:t>the keyword types and associated enumeration types. e.g. type is combinedError1; set </a:t>
+            </a:r>
+            <a:r>
+              <a:rPr lang="en-GB" dirty="0" err="1"/>
+              <a:t>algo</a:t>
+            </a:r>
+            <a:r>
+              <a:rPr lang="en-GB" dirty="0"/>
+              <a:t> is </a:t>
+            </a:r>
+            <a:r>
+              <a:rPr lang="en-GB" dirty="0" err="1"/>
+              <a:t>saem</a:t>
+            </a:r>
+            <a:r>
+              <a:rPr lang="en-GB" dirty="0" smtClean="0"/>
+              <a:t>.</a:t>
+            </a:r>
+            <a:endParaRPr lang="en-GB" dirty="0"/>
+          </a:p>
+        </p:txBody>
+      </p:sp>
+      <p:sp>
+        <p:nvSpPr>
+          <p:cNvPr id="4" name="Slide Number Placeholder 3"/>
+          <p:cNvSpPr>
+            <a:spLocks noGrp="1"/>
+          </p:cNvSpPr>
+          <p:nvPr>
+            <p:ph type="sldNum" sz="quarter" idx="10"/>
+          </p:nvPr>
+        </p:nvSpPr>
+        <p:spPr/>
+        <p:txBody>
+          <a:bodyPr/>
+          <a:lstStyle/>
+          <a:p>
+            <a:pPr marL="0" marR="0" lvl="0" indent="0" algn="r" rtl="0">
+              <a:spcBef>
+                <a:spcPts val="0"/>
+              </a:spcBef>
+              <a:spcAft>
+                <a:spcPts val="0"/>
+              </a:spcAft>
+              <a:buSzPct val="25000"/>
+              <a:buNone/>
+            </a:pPr>
+            <a:fld id="{00000000-1234-1234-1234-123412341234}" type="slidenum">
+              <a:rPr lang="en-GB" sz="1000" b="0" i="0" u="none" strike="noStrike" cap="none" smtClean="0">
+                <a:solidFill>
+                  <a:schemeClr val="dk1"/>
+                </a:solidFill>
+                <a:latin typeface="Calibri"/>
+                <a:ea typeface="Calibri"/>
+                <a:cs typeface="Calibri"/>
+                <a:sym typeface="Calibri"/>
+              </a:rPr>
+              <a:t>75</a:t>
             </a:fld>
             <a:endParaRPr lang="en-GB" sz="1000" b="0" i="0" u="none" strike="noStrike" cap="none">
               <a:solidFill>
@@ -44709,7 +45037,7 @@
 </p:sld>
 </file>
 
-<file path=ppt/slides/slide75.xml><?xml version="1.0" encoding="utf-8"?>
+<file path=ppt/slides/slide76.xml><?xml version="1.0" encoding="utf-8"?>
 <p:sld xmlns:a="http://schemas.openxmlformats.org/drawingml/2006/main" xmlns:r="http://schemas.openxmlformats.org/officeDocument/2006/relationships" xmlns:p="http://schemas.openxmlformats.org/presentationml/2006/main">
   <p:cSld>
     <p:spTree>
@@ -44830,7 +45158,7 @@
                 <a:cs typeface="Calibri"/>
                 <a:sym typeface="Calibri"/>
               </a:rPr>
-              <a:t>75</a:t>
+              <a:t>76</a:t>
             </a:fld>
             <a:endParaRPr lang="en-GB" sz="1000">
               <a:solidFill>
@@ -44867,7 +45195,7 @@
 </p:sld>
 </file>
 
-<file path=ppt/slides/slide76.xml><?xml version="1.0" encoding="utf-8"?>
+<file path=ppt/slides/slide77.xml><?xml version="1.0" encoding="utf-8"?>
 <p:sld xmlns:a="http://schemas.openxmlformats.org/drawingml/2006/main" xmlns:r="http://schemas.openxmlformats.org/officeDocument/2006/relationships" xmlns:p="http://schemas.openxmlformats.org/presentationml/2006/main">
   <p:cSld>
     <p:spTree>
@@ -45143,7 +45471,7 @@
                 <a:cs typeface="Calibri"/>
                 <a:sym typeface="Calibri"/>
               </a:rPr>
-              <a:t>76</a:t>
+              <a:t>77</a:t>
             </a:fld>
             <a:endParaRPr lang="en-GB" sz="1000">
               <a:solidFill>

</xml_diff>